<commit_message>
Do some modification on the function break doublons, then correct the bugs that a small table is scrollable, it was due to the responsive bootstrap class
</commit_message>
<xml_diff>
--- a/rendu/Réunion2/compte_rendu_presentation.pptx
+++ b/rendu/Réunion2/compte_rendu_presentation.pptx
@@ -109,6 +109,11 @@
       </a:defRPr>
     </a:lvl9pPr>
   </p:defaultTextStyle>
+  <p:extLst>
+    <p:ext uri="{EFAFB233-063F-42B5-8137-9DF3F51BA10A}">
+      <p15:sldGuideLst xmlns:p15="http://schemas.microsoft.com/office/powerpoint/2012/main"/>
+    </p:ext>
+  </p:extLst>
 </p:presentation>
 </file>
 
@@ -116,6 +121,9 @@
 <p1510:revInfo xmlns:a="http://schemas.openxmlformats.org/drawingml/2006/main" xmlns:r="http://schemas.openxmlformats.org/officeDocument/2006/relationships" xmlns:p1510="http://schemas.microsoft.com/office/powerpoint/2015/10/main">
   <p1510:revLst>
     <p1510:client id="{47C0E671-DAC3-4384-9B23-DCF598B5F84D}" v="30" dt="2021-11-07T17:56:17.714"/>
+    <p1510:client id="{9FB0D532-23DF-4D18-A03D-CA12A448F23E}" v="25" dt="2021-11-14T13:17:57.516"/>
+    <p1510:client id="{E56EA46B-BE25-4599-968A-C32EF8FFA045}" v="8" dt="2021-11-14T13:15:23.132"/>
+    <p1510:client id="{FA66ABD8-E9D0-4FBA-8621-7425E1B15029}" v="418" dt="2021-11-14T13:31:30.977"/>
   </p1510:revLst>
 </p1510:revInfo>
 </file>
@@ -125,7 +133,7 @@
   <pc:docChgLst>
     <pc:chgData name="LOUIS h" userId="3c19b57dbe931898" providerId="LiveId" clId="{47C0E671-DAC3-4384-9B23-DCF598B5F84D}"/>
     <pc:docChg chg="undo custSel addSld modSld modMainMaster">
-      <pc:chgData name="LOUIS h" userId="3c19b57dbe931898" providerId="LiveId" clId="{47C0E671-DAC3-4384-9B23-DCF598B5F84D}" dt="2021-11-07T17:56:24.277" v="1446" actId="12"/>
+      <pc:chgData name="LOUIS h" userId="3c19b57dbe931898" providerId="LiveId" clId="{47C0E671-DAC3-4384-9B23-DCF598B5F84D}" dt="2021-11-14T13:06:49.164" v="1455" actId="1076"/>
       <pc:docMkLst>
         <pc:docMk/>
       </pc:docMkLst>
@@ -175,8 +183,8 @@
           </ac:spMkLst>
         </pc:spChg>
       </pc:sldChg>
-      <pc:sldChg chg="addSp modSp new mod">
-        <pc:chgData name="LOUIS h" userId="3c19b57dbe931898" providerId="LiveId" clId="{47C0E671-DAC3-4384-9B23-DCF598B5F84D}" dt="2021-11-07T17:41:37.579" v="438"/>
+      <pc:sldChg chg="addSp delSp modSp new mod">
+        <pc:chgData name="LOUIS h" userId="3c19b57dbe931898" providerId="LiveId" clId="{47C0E671-DAC3-4384-9B23-DCF598B5F84D}" dt="2021-11-14T13:06:49.164" v="1455" actId="1076"/>
         <pc:sldMkLst>
           <pc:docMk/>
           <pc:sldMk cId="533737599" sldId="258"/>
@@ -189,8 +197,8 @@
             <ac:spMk id="2" creationId="{5D2CCA75-874A-4BDF-B88F-CA4C14B87C22}"/>
           </ac:spMkLst>
         </pc:spChg>
-        <pc:spChg chg="add mod">
-          <ac:chgData name="LOUIS h" userId="3c19b57dbe931898" providerId="LiveId" clId="{47C0E671-DAC3-4384-9B23-DCF598B5F84D}" dt="2021-11-07T17:41:37.579" v="438"/>
+        <pc:spChg chg="add del mod">
+          <ac:chgData name="LOUIS h" userId="3c19b57dbe931898" providerId="LiveId" clId="{47C0E671-DAC3-4384-9B23-DCF598B5F84D}" dt="2021-11-14T13:06:08.061" v="1447" actId="478"/>
           <ac:spMkLst>
             <pc:docMk/>
             <pc:sldMk cId="533737599" sldId="258"/>
@@ -198,7 +206,7 @@
           </ac:spMkLst>
         </pc:spChg>
         <pc:spChg chg="add mod">
-          <ac:chgData name="LOUIS h" userId="3c19b57dbe931898" providerId="LiveId" clId="{47C0E671-DAC3-4384-9B23-DCF598B5F84D}" dt="2021-11-07T17:41:35.794" v="437" actId="20577"/>
+          <ac:chgData name="LOUIS h" userId="3c19b57dbe931898" providerId="LiveId" clId="{47C0E671-DAC3-4384-9B23-DCF598B5F84D}" dt="2021-11-14T13:06:11.402" v="1449" actId="1076"/>
           <ac:spMkLst>
             <pc:docMk/>
             <pc:sldMk cId="533737599" sldId="258"/>
@@ -206,15 +214,15 @@
           </ac:spMkLst>
         </pc:spChg>
         <pc:spChg chg="add mod">
-          <ac:chgData name="LOUIS h" userId="3c19b57dbe931898" providerId="LiveId" clId="{47C0E671-DAC3-4384-9B23-DCF598B5F84D}" dt="2021-11-07T17:41:28.403" v="435"/>
+          <ac:chgData name="LOUIS h" userId="3c19b57dbe931898" providerId="LiveId" clId="{47C0E671-DAC3-4384-9B23-DCF598B5F84D}" dt="2021-11-14T13:06:23.688" v="1451" actId="1076"/>
           <ac:spMkLst>
             <pc:docMk/>
             <pc:sldMk cId="533737599" sldId="258"/>
             <ac:spMk id="7" creationId="{DE00930D-58B2-46DE-BDD5-7F725DB2CEC7}"/>
           </ac:spMkLst>
         </pc:spChg>
-        <pc:spChg chg="add mod">
-          <ac:chgData name="LOUIS h" userId="3c19b57dbe931898" providerId="LiveId" clId="{47C0E671-DAC3-4384-9B23-DCF598B5F84D}" dt="2021-11-07T15:25:38.281" v="418" actId="1076"/>
+        <pc:spChg chg="add del mod">
+          <ac:chgData name="LOUIS h" userId="3c19b57dbe931898" providerId="LiveId" clId="{47C0E671-DAC3-4384-9B23-DCF598B5F84D}" dt="2021-11-14T13:06:09.431" v="1448" actId="478"/>
           <ac:spMkLst>
             <pc:docMk/>
             <pc:sldMk cId="533737599" sldId="258"/>
@@ -222,7 +230,7 @@
           </ac:spMkLst>
         </pc:spChg>
         <pc:spChg chg="add mod">
-          <ac:chgData name="LOUIS h" userId="3c19b57dbe931898" providerId="LiveId" clId="{47C0E671-DAC3-4384-9B23-DCF598B5F84D}" dt="2021-11-07T15:25:42.622" v="420" actId="1076"/>
+          <ac:chgData name="LOUIS h" userId="3c19b57dbe931898" providerId="LiveId" clId="{47C0E671-DAC3-4384-9B23-DCF598B5F84D}" dt="2021-11-14T13:06:49.164" v="1455" actId="1076"/>
           <ac:spMkLst>
             <pc:docMk/>
             <pc:sldMk cId="533737599" sldId="258"/>
@@ -293,13 +301,13 @@
         </pc:spChg>
       </pc:sldChg>
       <pc:sldChg chg="addSp delSp modSp new mod">
-        <pc:chgData name="LOUIS h" userId="3c19b57dbe931898" providerId="LiveId" clId="{47C0E671-DAC3-4384-9B23-DCF598B5F84D}" dt="2021-11-07T17:56:05.421" v="1444" actId="12788"/>
+        <pc:chgData name="LOUIS h" userId="3c19b57dbe931898" providerId="LiveId" clId="{47C0E671-DAC3-4384-9B23-DCF598B5F84D}" dt="2021-11-14T13:06:48.844" v="1454" actId="1076"/>
         <pc:sldMkLst>
           <pc:docMk/>
           <pc:sldMk cId="628255553" sldId="261"/>
         </pc:sldMkLst>
         <pc:spChg chg="add mod">
-          <ac:chgData name="LOUIS h" userId="3c19b57dbe931898" providerId="LiveId" clId="{47C0E671-DAC3-4384-9B23-DCF598B5F84D}" dt="2021-11-07T17:56:05.421" v="1444" actId="12788"/>
+          <ac:chgData name="LOUIS h" userId="3c19b57dbe931898" providerId="LiveId" clId="{47C0E671-DAC3-4384-9B23-DCF598B5F84D}" dt="2021-11-14T13:06:48.844" v="1454" actId="1076"/>
           <ac:spMkLst>
             <pc:docMk/>
             <pc:sldMk cId="628255553" sldId="261"/>
@@ -412,6 +420,148 @@
       </pc:sldMasterChg>
     </pc:docChg>
   </pc:docChgLst>
+  <pc:docChgLst>
+    <pc:chgData name="Utilisateur invité" providerId="Windows Live" clId="Web-{E56EA46B-BE25-4599-968A-C32EF8FFA045}"/>
+    <pc:docChg chg="modSld">
+      <pc:chgData name="Utilisateur invité" userId="" providerId="Windows Live" clId="Web-{E56EA46B-BE25-4599-968A-C32EF8FFA045}" dt="2021-11-14T13:15:21.617" v="2" actId="20577"/>
+      <pc:docMkLst>
+        <pc:docMk/>
+      </pc:docMkLst>
+      <pc:sldChg chg="modSp">
+        <pc:chgData name="Utilisateur invité" userId="" providerId="Windows Live" clId="Web-{E56EA46B-BE25-4599-968A-C32EF8FFA045}" dt="2021-11-14T13:15:21.617" v="2" actId="20577"/>
+        <pc:sldMkLst>
+          <pc:docMk/>
+          <pc:sldMk cId="2222465883" sldId="257"/>
+        </pc:sldMkLst>
+        <pc:spChg chg="mod">
+          <ac:chgData name="Utilisateur invité" userId="" providerId="Windows Live" clId="Web-{E56EA46B-BE25-4599-968A-C32EF8FFA045}" dt="2021-11-14T13:15:21.617" v="2" actId="20577"/>
+          <ac:spMkLst>
+            <pc:docMk/>
+            <pc:sldMk cId="2222465883" sldId="257"/>
+            <ac:spMk id="2" creationId="{CB0B2AC1-302F-4BE1-9DF4-D761976E34CA}"/>
+          </ac:spMkLst>
+        </pc:spChg>
+      </pc:sldChg>
+    </pc:docChg>
+  </pc:docChgLst>
+  <pc:docChgLst>
+    <pc:chgData name="Max Descroix" userId="f54488145faa58a7" providerId="Windows Live" clId="Web-{FA66ABD8-E9D0-4FBA-8621-7425E1B15029}"/>
+    <pc:docChg chg="modSld">
+      <pc:chgData name="Max Descroix" userId="f54488145faa58a7" providerId="Windows Live" clId="Web-{FA66ABD8-E9D0-4FBA-8621-7425E1B15029}" dt="2021-11-14T13:31:30.977" v="364" actId="1076"/>
+      <pc:docMkLst>
+        <pc:docMk/>
+      </pc:docMkLst>
+      <pc:sldChg chg="addSp delSp modSp">
+        <pc:chgData name="Max Descroix" userId="f54488145faa58a7" providerId="Windows Live" clId="Web-{FA66ABD8-E9D0-4FBA-8621-7425E1B15029}" dt="2021-11-14T13:30:49.961" v="356"/>
+        <pc:sldMkLst>
+          <pc:docMk/>
+          <pc:sldMk cId="4126705910" sldId="260"/>
+        </pc:sldMkLst>
+        <pc:spChg chg="mod">
+          <ac:chgData name="Max Descroix" userId="f54488145faa58a7" providerId="Windows Live" clId="Web-{FA66ABD8-E9D0-4FBA-8621-7425E1B15029}" dt="2021-11-14T13:19:04.539" v="4" actId="1076"/>
+          <ac:spMkLst>
+            <pc:docMk/>
+            <pc:sldMk cId="4126705910" sldId="260"/>
+            <ac:spMk id="2" creationId="{5D2CCA75-874A-4BDF-B88F-CA4C14B87C22}"/>
+          </ac:spMkLst>
+        </pc:spChg>
+        <pc:spChg chg="del mod">
+          <ac:chgData name="Max Descroix" userId="f54488145faa58a7" providerId="Windows Live" clId="Web-{FA66ABD8-E9D0-4FBA-8621-7425E1B15029}" dt="2021-11-14T13:24:17.796" v="255"/>
+          <ac:spMkLst>
+            <pc:docMk/>
+            <pc:sldMk cId="4126705910" sldId="260"/>
+            <ac:spMk id="3" creationId="{FCC3E8AE-BB0E-419D-8C29-7BF50626EEE3}"/>
+          </ac:spMkLst>
+        </pc:spChg>
+        <pc:graphicFrameChg chg="add del mod modGraphic">
+          <ac:chgData name="Max Descroix" userId="f54488145faa58a7" providerId="Windows Live" clId="Web-{FA66ABD8-E9D0-4FBA-8621-7425E1B15029}" dt="2021-11-14T13:28:46.224" v="297"/>
+          <ac:graphicFrameMkLst>
+            <pc:docMk/>
+            <pc:sldMk cId="4126705910" sldId="260"/>
+            <ac:graphicFrameMk id="4" creationId="{08176887-2004-4FA6-AA1D-B6C7AE673369}"/>
+          </ac:graphicFrameMkLst>
+        </pc:graphicFrameChg>
+        <pc:graphicFrameChg chg="add mod modGraphic">
+          <ac:chgData name="Max Descroix" userId="f54488145faa58a7" providerId="Windows Live" clId="Web-{FA66ABD8-E9D0-4FBA-8621-7425E1B15029}" dt="2021-11-14T13:30:49.961" v="356"/>
+          <ac:graphicFrameMkLst>
+            <pc:docMk/>
+            <pc:sldMk cId="4126705910" sldId="260"/>
+            <ac:graphicFrameMk id="6" creationId="{FE59F89A-C57D-4207-87DE-C1AFC9C81146}"/>
+          </ac:graphicFrameMkLst>
+        </pc:graphicFrameChg>
+      </pc:sldChg>
+      <pc:sldChg chg="addSp delSp modSp">
+        <pc:chgData name="Max Descroix" userId="f54488145faa58a7" providerId="Windows Live" clId="Web-{FA66ABD8-E9D0-4FBA-8621-7425E1B15029}" dt="2021-11-14T13:31:30.977" v="364" actId="1076"/>
+        <pc:sldMkLst>
+          <pc:docMk/>
+          <pc:sldMk cId="628255553" sldId="261"/>
+        </pc:sldMkLst>
+        <pc:spChg chg="del mod">
+          <ac:chgData name="Max Descroix" userId="f54488145faa58a7" providerId="Windows Live" clId="Web-{FA66ABD8-E9D0-4FBA-8621-7425E1B15029}" dt="2021-11-14T13:24:21.186" v="256"/>
+          <ac:spMkLst>
+            <pc:docMk/>
+            <pc:sldMk cId="628255553" sldId="261"/>
+            <ac:spMk id="3" creationId="{BB5FF614-9F6E-4555-89EE-27824F7F1A15}"/>
+          </ac:spMkLst>
+        </pc:spChg>
+        <pc:spChg chg="add mod">
+          <ac:chgData name="Max Descroix" userId="f54488145faa58a7" providerId="Windows Live" clId="Web-{FA66ABD8-E9D0-4FBA-8621-7425E1B15029}" dt="2021-11-14T13:31:30.977" v="364" actId="1076"/>
+          <ac:spMkLst>
+            <pc:docMk/>
+            <pc:sldMk cId="628255553" sldId="261"/>
+            <ac:spMk id="5" creationId="{91EDAF69-76AD-4516-8612-382F3AF4AF8D}"/>
+          </ac:spMkLst>
+        </pc:spChg>
+        <pc:graphicFrameChg chg="add mod modGraphic">
+          <ac:chgData name="Max Descroix" userId="f54488145faa58a7" providerId="Windows Live" clId="Web-{FA66ABD8-E9D0-4FBA-8621-7425E1B15029}" dt="2021-11-14T13:30:36.664" v="324"/>
+          <ac:graphicFrameMkLst>
+            <pc:docMk/>
+            <pc:sldMk cId="628255553" sldId="261"/>
+            <ac:graphicFrameMk id="2" creationId="{9F88CBFE-04DC-45AA-8A1F-EA29EBB51707}"/>
+          </ac:graphicFrameMkLst>
+        </pc:graphicFrameChg>
+      </pc:sldChg>
+    </pc:docChg>
+  </pc:docChgLst>
+  <pc:docChgLst>
+    <pc:chgData name="theau santagiuliana" userId="cf6bbce5b70143e9" providerId="Windows Live" clId="Web-{9FB0D532-23DF-4D18-A03D-CA12A448F23E}"/>
+    <pc:docChg chg="modSld">
+      <pc:chgData name="theau santagiuliana" userId="cf6bbce5b70143e9" providerId="Windows Live" clId="Web-{9FB0D532-23DF-4D18-A03D-CA12A448F23E}" dt="2021-11-14T13:17:06.702" v="10" actId="20577"/>
+      <pc:docMkLst>
+        <pc:docMk/>
+      </pc:docMkLst>
+      <pc:sldChg chg="modSp">
+        <pc:chgData name="theau santagiuliana" userId="cf6bbce5b70143e9" providerId="Windows Live" clId="Web-{9FB0D532-23DF-4D18-A03D-CA12A448F23E}" dt="2021-11-14T13:15:26.356" v="3" actId="20577"/>
+        <pc:sldMkLst>
+          <pc:docMk/>
+          <pc:sldMk cId="2222465883" sldId="257"/>
+        </pc:sldMkLst>
+        <pc:spChg chg="mod">
+          <ac:chgData name="theau santagiuliana" userId="cf6bbce5b70143e9" providerId="Windows Live" clId="Web-{9FB0D532-23DF-4D18-A03D-CA12A448F23E}" dt="2021-11-14T13:15:26.356" v="3" actId="20577"/>
+          <ac:spMkLst>
+            <pc:docMk/>
+            <pc:sldMk cId="2222465883" sldId="257"/>
+            <ac:spMk id="2" creationId="{CB0B2AC1-302F-4BE1-9DF4-D761976E34CA}"/>
+          </ac:spMkLst>
+        </pc:spChg>
+      </pc:sldChg>
+      <pc:sldChg chg="modSp">
+        <pc:chgData name="theau santagiuliana" userId="cf6bbce5b70143e9" providerId="Windows Live" clId="Web-{9FB0D532-23DF-4D18-A03D-CA12A448F23E}" dt="2021-11-14T13:17:06.702" v="10" actId="20577"/>
+        <pc:sldMkLst>
+          <pc:docMk/>
+          <pc:sldMk cId="628255553" sldId="261"/>
+        </pc:sldMkLst>
+        <pc:spChg chg="mod">
+          <ac:chgData name="theau santagiuliana" userId="cf6bbce5b70143e9" providerId="Windows Live" clId="Web-{9FB0D532-23DF-4D18-A03D-CA12A448F23E}" dt="2021-11-14T13:17:06.702" v="10" actId="20577"/>
+          <ac:spMkLst>
+            <pc:docMk/>
+            <pc:sldMk cId="628255553" sldId="261"/>
+            <ac:spMk id="3" creationId="{BB5FF614-9F6E-4555-89EE-27824F7F1A15}"/>
+          </ac:spMkLst>
+        </pc:spChg>
+      </pc:sldChg>
+    </pc:docChg>
+  </pc:docChgLst>
 </pc:chgInfo>
 </file>
 
@@ -562,7 +712,7 @@
           <a:p>
             <a:fld id="{7B1B4679-9E8C-4348-B8D3-231D02E9AF43}" type="datetimeFigureOut">
               <a:rPr lang="fr-FR" smtClean="0"/>
-              <a:t>07/11/2021</a:t>
+              <a:t>14/11/2021</a:t>
             </a:fld>
             <a:endParaRPr lang="fr-FR"/>
           </a:p>
@@ -616,7 +766,7 @@
           <a:p>
             <a:fld id="{54DF5B3C-8D38-4D5E-BE25-A2025335896E}" type="slidenum">
               <a:rPr lang="fr-FR" smtClean="0"/>
-              <a:t>‹N°›</a:t>
+              <a:t>‹#›</a:t>
             </a:fld>
             <a:endParaRPr lang="fr-FR"/>
           </a:p>
@@ -760,7 +910,7 @@
           <a:p>
             <a:fld id="{7B1B4679-9E8C-4348-B8D3-231D02E9AF43}" type="datetimeFigureOut">
               <a:rPr lang="fr-FR" smtClean="0"/>
-              <a:t>07/11/2021</a:t>
+              <a:t>14/11/2021</a:t>
             </a:fld>
             <a:endParaRPr lang="fr-FR"/>
           </a:p>
@@ -814,7 +964,7 @@
           <a:p>
             <a:fld id="{54DF5B3C-8D38-4D5E-BE25-A2025335896E}" type="slidenum">
               <a:rPr lang="fr-FR" smtClean="0"/>
-              <a:t>‹N°›</a:t>
+              <a:t>‹#›</a:t>
             </a:fld>
             <a:endParaRPr lang="fr-FR"/>
           </a:p>
@@ -968,7 +1118,7 @@
           <a:p>
             <a:fld id="{7B1B4679-9E8C-4348-B8D3-231D02E9AF43}" type="datetimeFigureOut">
               <a:rPr lang="fr-FR" smtClean="0"/>
-              <a:t>07/11/2021</a:t>
+              <a:t>14/11/2021</a:t>
             </a:fld>
             <a:endParaRPr lang="fr-FR"/>
           </a:p>
@@ -1022,7 +1172,7 @@
           <a:p>
             <a:fld id="{54DF5B3C-8D38-4D5E-BE25-A2025335896E}" type="slidenum">
               <a:rPr lang="fr-FR" smtClean="0"/>
-              <a:t>‹N°›</a:t>
+              <a:t>‹#›</a:t>
             </a:fld>
             <a:endParaRPr lang="fr-FR"/>
           </a:p>
@@ -1166,7 +1316,7 @@
           <a:p>
             <a:fld id="{7B1B4679-9E8C-4348-B8D3-231D02E9AF43}" type="datetimeFigureOut">
               <a:rPr lang="fr-FR" smtClean="0"/>
-              <a:t>07/11/2021</a:t>
+              <a:t>14/11/2021</a:t>
             </a:fld>
             <a:endParaRPr lang="fr-FR"/>
           </a:p>
@@ -1220,7 +1370,7 @@
           <a:p>
             <a:fld id="{54DF5B3C-8D38-4D5E-BE25-A2025335896E}" type="slidenum">
               <a:rPr lang="fr-FR" smtClean="0"/>
-              <a:t>‹N°›</a:t>
+              <a:t>‹#›</a:t>
             </a:fld>
             <a:endParaRPr lang="fr-FR"/>
           </a:p>
@@ -1441,7 +1591,7 @@
           <a:p>
             <a:fld id="{7B1B4679-9E8C-4348-B8D3-231D02E9AF43}" type="datetimeFigureOut">
               <a:rPr lang="fr-FR" smtClean="0"/>
-              <a:t>07/11/2021</a:t>
+              <a:t>14/11/2021</a:t>
             </a:fld>
             <a:endParaRPr lang="fr-FR"/>
           </a:p>
@@ -1495,7 +1645,7 @@
           <a:p>
             <a:fld id="{54DF5B3C-8D38-4D5E-BE25-A2025335896E}" type="slidenum">
               <a:rPr lang="fr-FR" smtClean="0"/>
-              <a:t>‹N°›</a:t>
+              <a:t>‹#›</a:t>
             </a:fld>
             <a:endParaRPr lang="fr-FR"/>
           </a:p>
@@ -1706,7 +1856,7 @@
           <a:p>
             <a:fld id="{7B1B4679-9E8C-4348-B8D3-231D02E9AF43}" type="datetimeFigureOut">
               <a:rPr lang="fr-FR" smtClean="0"/>
-              <a:t>07/11/2021</a:t>
+              <a:t>14/11/2021</a:t>
             </a:fld>
             <a:endParaRPr lang="fr-FR"/>
           </a:p>
@@ -1760,7 +1910,7 @@
           <a:p>
             <a:fld id="{54DF5B3C-8D38-4D5E-BE25-A2025335896E}" type="slidenum">
               <a:rPr lang="fr-FR" smtClean="0"/>
-              <a:t>‹N°›</a:t>
+              <a:t>‹#›</a:t>
             </a:fld>
             <a:endParaRPr lang="fr-FR"/>
           </a:p>
@@ -2118,7 +2268,7 @@
           <a:p>
             <a:fld id="{7B1B4679-9E8C-4348-B8D3-231D02E9AF43}" type="datetimeFigureOut">
               <a:rPr lang="fr-FR" smtClean="0"/>
-              <a:t>07/11/2021</a:t>
+              <a:t>14/11/2021</a:t>
             </a:fld>
             <a:endParaRPr lang="fr-FR"/>
           </a:p>
@@ -2172,7 +2322,7 @@
           <a:p>
             <a:fld id="{54DF5B3C-8D38-4D5E-BE25-A2025335896E}" type="slidenum">
               <a:rPr lang="fr-FR" smtClean="0"/>
-              <a:t>‹N°›</a:t>
+              <a:t>‹#›</a:t>
             </a:fld>
             <a:endParaRPr lang="fr-FR"/>
           </a:p>
@@ -2259,7 +2409,7 @@
           <a:p>
             <a:fld id="{7B1B4679-9E8C-4348-B8D3-231D02E9AF43}" type="datetimeFigureOut">
               <a:rPr lang="fr-FR" smtClean="0"/>
-              <a:t>07/11/2021</a:t>
+              <a:t>14/11/2021</a:t>
             </a:fld>
             <a:endParaRPr lang="fr-FR"/>
           </a:p>
@@ -2313,7 +2463,7 @@
           <a:p>
             <a:fld id="{54DF5B3C-8D38-4D5E-BE25-A2025335896E}" type="slidenum">
               <a:rPr lang="fr-FR" smtClean="0"/>
-              <a:t>‹N°›</a:t>
+              <a:t>‹#›</a:t>
             </a:fld>
             <a:endParaRPr lang="fr-FR"/>
           </a:p>
@@ -2372,7 +2522,7 @@
           <a:p>
             <a:fld id="{7B1B4679-9E8C-4348-B8D3-231D02E9AF43}" type="datetimeFigureOut">
               <a:rPr lang="fr-FR" smtClean="0"/>
-              <a:t>07/11/2021</a:t>
+              <a:t>14/11/2021</a:t>
             </a:fld>
             <a:endParaRPr lang="fr-FR"/>
           </a:p>
@@ -2426,7 +2576,7 @@
           <a:p>
             <a:fld id="{54DF5B3C-8D38-4D5E-BE25-A2025335896E}" type="slidenum">
               <a:rPr lang="fr-FR" smtClean="0"/>
-              <a:t>‹N°›</a:t>
+              <a:t>‹#›</a:t>
             </a:fld>
             <a:endParaRPr lang="fr-FR"/>
           </a:p>
@@ -2683,7 +2833,7 @@
           <a:p>
             <a:fld id="{7B1B4679-9E8C-4348-B8D3-231D02E9AF43}" type="datetimeFigureOut">
               <a:rPr lang="fr-FR" smtClean="0"/>
-              <a:t>07/11/2021</a:t>
+              <a:t>14/11/2021</a:t>
             </a:fld>
             <a:endParaRPr lang="fr-FR"/>
           </a:p>
@@ -2737,7 +2887,7 @@
           <a:p>
             <a:fld id="{54DF5B3C-8D38-4D5E-BE25-A2025335896E}" type="slidenum">
               <a:rPr lang="fr-FR" smtClean="0"/>
-              <a:t>‹N°›</a:t>
+              <a:t>‹#›</a:t>
             </a:fld>
             <a:endParaRPr lang="fr-FR"/>
           </a:p>
@@ -2971,7 +3121,7 @@
           <a:p>
             <a:fld id="{7B1B4679-9E8C-4348-B8D3-231D02E9AF43}" type="datetimeFigureOut">
               <a:rPr lang="fr-FR" smtClean="0"/>
-              <a:t>07/11/2021</a:t>
+              <a:t>14/11/2021</a:t>
             </a:fld>
             <a:endParaRPr lang="fr-FR"/>
           </a:p>
@@ -3025,7 +3175,7 @@
           <a:p>
             <a:fld id="{54DF5B3C-8D38-4D5E-BE25-A2025335896E}" type="slidenum">
               <a:rPr lang="fr-FR" smtClean="0"/>
-              <a:t>‹N°›</a:t>
+              <a:t>‹#›</a:t>
             </a:fld>
             <a:endParaRPr lang="fr-FR"/>
           </a:p>
@@ -3215,7 +3365,7 @@
           <a:p>
             <a:fld id="{7B1B4679-9E8C-4348-B8D3-231D02E9AF43}" type="datetimeFigureOut">
               <a:rPr lang="fr-FR" smtClean="0"/>
-              <a:t>07/11/2021</a:t>
+              <a:t>14/11/2021</a:t>
             </a:fld>
             <a:endParaRPr lang="fr-FR"/>
           </a:p>
@@ -3305,7 +3455,7 @@
           <a:p>
             <a:fld id="{54DF5B3C-8D38-4D5E-BE25-A2025335896E}" type="slidenum">
               <a:rPr lang="fr-FR" smtClean="0"/>
-              <a:t>‹N°›</a:t>
+              <a:t>‹#›</a:t>
             </a:fld>
             <a:endParaRPr lang="fr-FR"/>
           </a:p>
@@ -3662,7 +3812,7 @@
           <a:p>
             <a:pPr algn="ctr"/>
             <a:r>
-              <a:rPr lang="fr-FR" sz="4400" b="1" dirty="0">
+              <a:rPr lang="fr-FR" sz="4400" b="1">
                 <a:solidFill>
                   <a:schemeClr val="bg1"/>
                 </a:solidFill>
@@ -3726,13 +3876,13 @@
           <a:noFill/>
         </p:spPr>
         <p:txBody>
-          <a:bodyPr wrap="square" rtlCol="0">
+          <a:bodyPr wrap="square" lIns="91440" tIns="45720" rIns="91440" bIns="45720" rtlCol="0" anchor="t">
             <a:spAutoFit/>
           </a:bodyPr>
           <a:lstStyle/>
           <a:p>
             <a:r>
-              <a:rPr lang="fr-FR" sz="3200" b="1" u="sng" dirty="0">
+              <a:rPr lang="fr-FR" sz="3200" b="1" u="sng">
                 <a:solidFill>
                   <a:schemeClr val="bg1"/>
                 </a:solidFill>
@@ -3742,7 +3892,7 @@
             </a:r>
           </a:p>
           <a:p>
-            <a:endParaRPr lang="fr-FR" dirty="0">
+            <a:endParaRPr lang="fr-FR">
               <a:solidFill>
                 <a:schemeClr val="bg1"/>
               </a:solidFill>
@@ -3758,7 +3908,7 @@
               <a:buAutoNum type="arabicPeriod"/>
             </a:pPr>
             <a:r>
-              <a:rPr lang="fr-FR" sz="2800" dirty="0">
+              <a:rPr lang="fr-FR" sz="2800">
                 <a:solidFill>
                   <a:schemeClr val="bg1"/>
                 </a:solidFill>
@@ -3776,7 +3926,7 @@
               <a:buAutoNum type="arabicPeriod"/>
             </a:pPr>
             <a:r>
-              <a:rPr lang="fr-FR" sz="2800" dirty="0">
+              <a:rPr lang="fr-FR" sz="2800">
                 <a:solidFill>
                   <a:schemeClr val="bg1"/>
                 </a:solidFill>
@@ -3794,7 +3944,7 @@
               <a:buAutoNum type="arabicPeriod"/>
             </a:pPr>
             <a:r>
-              <a:rPr lang="fr-FR" sz="2800" dirty="0">
+              <a:rPr lang="fr-FR" sz="2800">
                 <a:solidFill>
                   <a:schemeClr val="bg1"/>
                 </a:solidFill>
@@ -3812,15 +3962,15 @@
               <a:buAutoNum type="arabicPeriod"/>
             </a:pPr>
             <a:r>
-              <a:rPr lang="fr-FR" sz="2800" dirty="0">
+              <a:rPr lang="fr-FR" sz="2800">
                 <a:solidFill>
                   <a:schemeClr val="bg1"/>
                 </a:solidFill>
-                <a:latin typeface="Comfortaa" panose="00000500000000000000" pitchFamily="2" charset="0"/>
+                <a:latin typeface="Comfortaa"/>
               </a:rPr>
-              <a:t>Modifications et amélioration </a:t>
-            </a:r>
-            <a:endParaRPr lang="fr-FR" dirty="0">
+              <a:t>Modifications et améliorations</a:t>
+            </a:r>
+            <a:endParaRPr lang="fr-FR" sz="2800">
               <a:solidFill>
                 <a:schemeClr val="bg1"/>
               </a:solidFill>
@@ -3940,7 +4090,7 @@
           <a:lstStyle/>
           <a:p>
             <a:r>
-              <a:rPr lang="fr-FR" sz="2400" b="1" dirty="0">
+              <a:rPr lang="fr-FR" sz="2400" b="1">
                 <a:solidFill>
                   <a:schemeClr val="bg1"/>
                 </a:solidFill>
@@ -3950,16 +4100,16 @@
             </a:r>
           </a:p>
           <a:p>
-            <a:endParaRPr lang="fr-FR" sz="2400" b="1" dirty="0"/>
-          </a:p>
-        </p:txBody>
-      </p:sp>
-      <p:sp>
-        <p:nvSpPr>
-          <p:cNvPr id="3" name="ZoneTexte 2">
-            <a:extLst>
-              <a:ext uri="{FF2B5EF4-FFF2-40B4-BE49-F238E27FC236}">
-                <a16:creationId xmlns:a16="http://schemas.microsoft.com/office/drawing/2014/main" id="{9C33410D-7BF7-4294-8F8F-64CB079C26C6}"/>
+            <a:endParaRPr lang="fr-FR" sz="2400" b="1"/>
+          </a:p>
+        </p:txBody>
+      </p:sp>
+      <p:sp>
+        <p:nvSpPr>
+          <p:cNvPr id="5" name="ZoneTexte 4">
+            <a:extLst>
+              <a:ext uri="{FF2B5EF4-FFF2-40B4-BE49-F238E27FC236}">
+                <a16:creationId xmlns:a16="http://schemas.microsoft.com/office/drawing/2014/main" id="{5BD75D86-E78B-4E00-8D7E-9AB9F1BC0F99}"/>
               </a:ext>
             </a:extLst>
           </p:cNvPr>
@@ -3968,48 +4118,7 @@
         </p:nvSpPr>
         <p:spPr>
           <a:xfrm>
-            <a:off x="2946646" y="3220112"/>
-            <a:ext cx="6196614" cy="400110"/>
-          </a:xfrm>
-          <a:prstGeom prst="rect">
-            <a:avLst/>
-          </a:prstGeom>
-          <a:noFill/>
-        </p:spPr>
-        <p:txBody>
-          <a:bodyPr wrap="square" rtlCol="0" anchor="ctr">
-            <a:spAutoFit/>
-          </a:bodyPr>
-          <a:lstStyle/>
-          <a:p>
-            <a:pPr algn="ctr"/>
-            <a:r>
-              <a:rPr lang="fr-FR" sz="2000" dirty="0">
-                <a:solidFill>
-                  <a:schemeClr val="bg1"/>
-                </a:solidFill>
-                <a:latin typeface="Comfortaa" panose="00000500000000000000" pitchFamily="2" charset="0"/>
-              </a:rPr>
-              <a:t>But du projet</a:t>
-            </a:r>
-          </a:p>
-        </p:txBody>
-      </p:sp>
-      <p:sp>
-        <p:nvSpPr>
-          <p:cNvPr id="5" name="ZoneTexte 4">
-            <a:extLst>
-              <a:ext uri="{FF2B5EF4-FFF2-40B4-BE49-F238E27FC236}">
-                <a16:creationId xmlns:a16="http://schemas.microsoft.com/office/drawing/2014/main" id="{5BD75D86-E78B-4E00-8D7E-9AB9F1BC0F99}"/>
-              </a:ext>
-            </a:extLst>
-          </p:cNvPr>
-          <p:cNvSpPr txBox="1"/>
-          <p:nvPr/>
-        </p:nvSpPr>
-        <p:spPr>
-          <a:xfrm>
-            <a:off x="3048740" y="4581832"/>
+            <a:off x="3058409" y="4181723"/>
             <a:ext cx="6094520" cy="400110"/>
           </a:xfrm>
           <a:prstGeom prst="rect">
@@ -4025,7 +4134,7 @@
           <a:p>
             <a:pPr algn="ctr"/>
             <a:r>
-              <a:rPr lang="fr-FR" sz="2000" dirty="0">
+              <a:rPr lang="fr-FR" sz="2000">
                 <a:solidFill>
                   <a:schemeClr val="bg1"/>
                 </a:solidFill>
@@ -4050,7 +4159,7 @@
         </p:nvSpPr>
         <p:spPr>
           <a:xfrm>
-            <a:off x="3048740" y="1876058"/>
+            <a:off x="3048740" y="2129691"/>
             <a:ext cx="6094520" cy="400110"/>
           </a:xfrm>
           <a:prstGeom prst="rect">
@@ -4066,7 +4175,7 @@
           <a:p>
             <a:pPr algn="ctr"/>
             <a:r>
-              <a:rPr lang="fr-FR" sz="2000" dirty="0">
+              <a:rPr lang="fr-FR" sz="2000">
                 <a:solidFill>
                   <a:schemeClr val="bg1"/>
                 </a:solidFill>
@@ -4079,10 +4188,10 @@
       </p:sp>
       <p:sp>
         <p:nvSpPr>
-          <p:cNvPr id="8" name="Rectangle : coins arrondis 7">
-            <a:extLst>
-              <a:ext uri="{FF2B5EF4-FFF2-40B4-BE49-F238E27FC236}">
-                <a16:creationId xmlns:a16="http://schemas.microsoft.com/office/drawing/2014/main" id="{CCCA2FFE-3DB7-4187-BBCE-197590E76FF2}"/>
+          <p:cNvPr id="9" name="Rectangle : coins arrondis 8">
+            <a:extLst>
+              <a:ext uri="{FF2B5EF4-FFF2-40B4-BE49-F238E27FC236}">
+                <a16:creationId xmlns:a16="http://schemas.microsoft.com/office/drawing/2014/main" id="{B0948E4F-C3BC-46ED-A178-CD931E70AD5C}"/>
               </a:ext>
             </a:extLst>
           </p:cNvPr>
@@ -4091,59 +4200,7 @@
         </p:nvSpPr>
         <p:spPr>
           <a:xfrm>
-            <a:off x="4305670" y="4087443"/>
-            <a:ext cx="3600000" cy="36000"/>
-          </a:xfrm>
-          <a:prstGeom prst="roundRect">
-            <a:avLst/>
-          </a:prstGeom>
-          <a:solidFill>
-            <a:schemeClr val="bg1"/>
-          </a:solidFill>
-          <a:ln>
-            <a:noFill/>
-          </a:ln>
-        </p:spPr>
-        <p:style>
-          <a:lnRef idx="2">
-            <a:schemeClr val="accent1">
-              <a:shade val="50000"/>
-            </a:schemeClr>
-          </a:lnRef>
-          <a:fillRef idx="1">
-            <a:schemeClr val="accent1"/>
-          </a:fillRef>
-          <a:effectRef idx="0">
-            <a:schemeClr val="accent1"/>
-          </a:effectRef>
-          <a:fontRef idx="minor">
-            <a:schemeClr val="lt1"/>
-          </a:fontRef>
-        </p:style>
-        <p:txBody>
-          <a:bodyPr rtlCol="0" anchor="ctr"/>
-          <a:lstStyle/>
-          <a:p>
-            <a:pPr algn="ctr"/>
-            <a:endParaRPr lang="fr-FR"/>
-          </a:p>
-        </p:txBody>
-      </p:sp>
-      <p:sp>
-        <p:nvSpPr>
-          <p:cNvPr id="9" name="Rectangle : coins arrondis 8">
-            <a:extLst>
-              <a:ext uri="{FF2B5EF4-FFF2-40B4-BE49-F238E27FC236}">
-                <a16:creationId xmlns:a16="http://schemas.microsoft.com/office/drawing/2014/main" id="{B0948E4F-C3BC-46ED-A178-CD931E70AD5C}"/>
-              </a:ext>
-            </a:extLst>
-          </p:cNvPr>
-          <p:cNvSpPr/>
-          <p:nvPr/>
-        </p:nvSpPr>
-        <p:spPr>
-          <a:xfrm>
-            <a:off x="4305670" y="2730140"/>
+            <a:off x="4305669" y="3429000"/>
             <a:ext cx="3600000" cy="36000"/>
           </a:xfrm>
           <a:prstGeom prst="roundRect">
@@ -4211,12 +4268,869 @@
           <a:chExt cx="0" cy="0"/>
         </a:xfrm>
       </p:grpSpPr>
-      <p:sp>
-        <p:nvSpPr>
-          <p:cNvPr id="3" name="ZoneTexte 2">
-            <a:extLst>
-              <a:ext uri="{FF2B5EF4-FFF2-40B4-BE49-F238E27FC236}">
-                <a16:creationId xmlns:a16="http://schemas.microsoft.com/office/drawing/2014/main" id="{BB5FF614-9F6E-4555-89EE-27824F7F1A15}"/>
+      <p:graphicFrame>
+        <p:nvGraphicFramePr>
+          <p:cNvPr id="2" name="Table 4">
+            <a:extLst>
+              <a:ext uri="{FF2B5EF4-FFF2-40B4-BE49-F238E27FC236}">
+                <a16:creationId xmlns:a16="http://schemas.microsoft.com/office/drawing/2014/main" id="{9F88CBFE-04DC-45AA-8A1F-EA29EBB51707}"/>
+              </a:ext>
+            </a:extLst>
+          </p:cNvPr>
+          <p:cNvGraphicFramePr>
+            <a:graphicFrameLocks noGrp="1"/>
+          </p:cNvGraphicFramePr>
+          <p:nvPr>
+            <p:extLst>
+              <p:ext uri="{D42A27DB-BD31-4B8C-83A1-F6EECF244321}">
+                <p14:modId xmlns:p14="http://schemas.microsoft.com/office/powerpoint/2010/main" val="2665002759"/>
+              </p:ext>
+            </p:extLst>
+          </p:nvPr>
+        </p:nvGraphicFramePr>
+        <p:xfrm>
+          <a:off x="1821392" y="924915"/>
+          <a:ext cx="8168637" cy="5731731"/>
+        </p:xfrm>
+        <a:graphic>
+          <a:graphicData uri="http://schemas.openxmlformats.org/drawingml/2006/table">
+            <a:tbl>
+              <a:tblPr firstRow="1" bandRow="1">
+                <a:tableStyleId>{5C22544A-7EE6-4342-B048-85BDC9FD1C3A}</a:tableStyleId>
+              </a:tblPr>
+              <a:tblGrid>
+                <a:gridCol w="406977">
+                  <a:extLst>
+                    <a:ext uri="{9D8B030D-6E8A-4147-A177-3AD203B41FA5}">
+                      <a16:colId xmlns:a16="http://schemas.microsoft.com/office/drawing/2014/main" val="73613294"/>
+                    </a:ext>
+                  </a:extLst>
+                </a:gridCol>
+                <a:gridCol w="7761660">
+                  <a:extLst>
+                    <a:ext uri="{9D8B030D-6E8A-4147-A177-3AD203B41FA5}">
+                      <a16:colId xmlns:a16="http://schemas.microsoft.com/office/drawing/2014/main" val="1847866015"/>
+                    </a:ext>
+                  </a:extLst>
+                </a:gridCol>
+              </a:tblGrid>
+              <a:tr h="372340">
+                <a:tc>
+                  <a:txBody>
+                    <a:bodyPr/>
+                    <a:lstStyle/>
+                    <a:p>
+                      <a:endParaRPr lang="en-US">
+                        <a:solidFill>
+                          <a:schemeClr val="tx1"/>
+                        </a:solidFill>
+                      </a:endParaRPr>
+                    </a:p>
+                  </a:txBody>
+                  <a:tcPr/>
+                </a:tc>
+                <a:tc>
+                  <a:txBody>
+                    <a:bodyPr/>
+                    <a:lstStyle/>
+                    <a:p>
+                      <a:r>
+                        <a:rPr lang="en-US" err="1">
+                          <a:solidFill>
+                            <a:schemeClr val="bg1"/>
+                          </a:solidFill>
+                        </a:rPr>
+                        <a:t>Tâches</a:t>
+                      </a:r>
+                      <a:r>
+                        <a:rPr lang="en-US">
+                          <a:solidFill>
+                            <a:schemeClr val="bg1"/>
+                          </a:solidFill>
+                        </a:rPr>
+                        <a:t> à  </a:t>
+                      </a:r>
+                      <a:r>
+                        <a:rPr lang="en-US" err="1">
+                          <a:solidFill>
+                            <a:schemeClr val="bg1"/>
+                          </a:solidFill>
+                        </a:rPr>
+                        <a:t>accomplir</a:t>
+                      </a:r>
+                      <a:r>
+                        <a:rPr lang="en-US">
+                          <a:solidFill>
+                            <a:schemeClr val="bg1"/>
+                          </a:solidFill>
+                        </a:rPr>
+                        <a:t> :</a:t>
+                      </a:r>
+                    </a:p>
+                  </a:txBody>
+                  <a:tcPr/>
+                </a:tc>
+                <a:extLst>
+                  <a:ext uri="{0D108BD9-81ED-4DB2-BD59-A6C34878D82A}">
+                    <a16:rowId xmlns:a16="http://schemas.microsoft.com/office/drawing/2014/main" val="3542665727"/>
+                  </a:ext>
+                </a:extLst>
+              </a:tr>
+              <a:tr h="370840">
+                <a:tc>
+                  <a:txBody>
+                    <a:bodyPr/>
+                    <a:lstStyle/>
+                    <a:p>
+                      <a:pPr lvl="0">
+                        <a:buNone/>
+                      </a:pPr>
+                      <a:endParaRPr lang="en-US" sz="1800" b="0" i="0" u="none" strike="noStrike" noProof="0">
+                        <a:solidFill>
+                          <a:schemeClr val="accent6"/>
+                        </a:solidFill>
+                        <a:latin typeface="Calibri"/>
+                      </a:endParaRPr>
+                    </a:p>
+                  </a:txBody>
+                  <a:tcPr/>
+                </a:tc>
+                <a:tc>
+                  <a:txBody>
+                    <a:bodyPr/>
+                    <a:lstStyle/>
+                    <a:p>
+                      <a:pPr lvl="0">
+                        <a:buNone/>
+                      </a:pPr>
+                      <a:r>
+                        <a:rPr lang="fr-FR" sz="1800" b="0" i="0" u="none" strike="noStrike" noProof="0">
+                          <a:solidFill>
+                            <a:schemeClr val="tx1"/>
+                          </a:solidFill>
+                          <a:latin typeface="Arial"/>
+                        </a:rPr>
+                        <a:t>Les professeurs doivent manger entre 13h et 14h</a:t>
+                      </a:r>
+                      <a:endParaRPr lang="en-US">
+                        <a:solidFill>
+                          <a:schemeClr val="tx1"/>
+                        </a:solidFill>
+                        <a:latin typeface="Arial"/>
+                      </a:endParaRPr>
+                    </a:p>
+                  </a:txBody>
+                  <a:tcPr/>
+                </a:tc>
+                <a:extLst>
+                  <a:ext uri="{0D108BD9-81ED-4DB2-BD59-A6C34878D82A}">
+                    <a16:rowId xmlns:a16="http://schemas.microsoft.com/office/drawing/2014/main" val="4279919142"/>
+                  </a:ext>
+                </a:extLst>
+              </a:tr>
+              <a:tr h="370840">
+                <a:tc>
+                  <a:txBody>
+                    <a:bodyPr/>
+                    <a:lstStyle/>
+                    <a:p>
+                      <a:pPr lvl="0">
+                        <a:buNone/>
+                      </a:pPr>
+                      <a:endParaRPr lang="en-US" sz="1800" b="0" i="0" u="none" strike="noStrike" noProof="0">
+                        <a:solidFill>
+                          <a:schemeClr val="accent6"/>
+                        </a:solidFill>
+                        <a:latin typeface="Calibri"/>
+                      </a:endParaRPr>
+                    </a:p>
+                  </a:txBody>
+                  <a:tcPr/>
+                </a:tc>
+                <a:tc>
+                  <a:txBody>
+                    <a:bodyPr/>
+                    <a:lstStyle/>
+                    <a:p>
+                      <a:pPr lvl="0">
+                        <a:buNone/>
+                      </a:pPr>
+                      <a:r>
+                        <a:rPr lang="fr-FR" sz="1800" b="0" i="0" u="none" strike="noStrike" noProof="0">
+                          <a:solidFill>
+                            <a:schemeClr val="tx1"/>
+                          </a:solidFill>
+                          <a:latin typeface="Arial"/>
+                        </a:rPr>
+                        <a:t>Après la génération du planning, pouvoir rajouter des créneaux</a:t>
+                      </a:r>
+                      <a:endParaRPr lang="en-US">
+                        <a:solidFill>
+                          <a:schemeClr val="tx1"/>
+                        </a:solidFill>
+                        <a:latin typeface="Arial"/>
+                      </a:endParaRPr>
+                    </a:p>
+                  </a:txBody>
+                  <a:tcPr/>
+                </a:tc>
+                <a:extLst>
+                  <a:ext uri="{0D108BD9-81ED-4DB2-BD59-A6C34878D82A}">
+                    <a16:rowId xmlns:a16="http://schemas.microsoft.com/office/drawing/2014/main" val="4257036857"/>
+                  </a:ext>
+                </a:extLst>
+              </a:tr>
+              <a:tr h="370840">
+                <a:tc>
+                  <a:txBody>
+                    <a:bodyPr/>
+                    <a:lstStyle/>
+                    <a:p>
+                      <a:pPr lvl="0">
+                        <a:buNone/>
+                      </a:pPr>
+                      <a:endParaRPr lang="en-US" sz="1800" b="0" i="0" u="none" strike="noStrike" noProof="0">
+                        <a:solidFill>
+                          <a:schemeClr val="accent6"/>
+                        </a:solidFill>
+                        <a:latin typeface="Calibri"/>
+                      </a:endParaRPr>
+                    </a:p>
+                  </a:txBody>
+                  <a:tcPr/>
+                </a:tc>
+                <a:tc>
+                  <a:txBody>
+                    <a:bodyPr/>
+                    <a:lstStyle/>
+                    <a:p>
+                      <a:pPr lvl="0">
+                        <a:buNone/>
+                      </a:pPr>
+                      <a:r>
+                        <a:rPr lang="fr-FR" sz="1800" b="0" i="0" u="none" strike="noStrike" noProof="0">
+                          <a:solidFill>
+                            <a:schemeClr val="tx1"/>
+                          </a:solidFill>
+                          <a:latin typeface="Arial"/>
+                        </a:rPr>
+                        <a:t>Avoir un créneau vide toutes les 2h30 (5 x 30min)</a:t>
+                      </a:r>
+                      <a:endParaRPr lang="en-US">
+                        <a:solidFill>
+                          <a:schemeClr val="tx1"/>
+                        </a:solidFill>
+                        <a:latin typeface="Arial"/>
+                      </a:endParaRPr>
+                    </a:p>
+                  </a:txBody>
+                  <a:tcPr/>
+                </a:tc>
+                <a:extLst>
+                  <a:ext uri="{0D108BD9-81ED-4DB2-BD59-A6C34878D82A}">
+                    <a16:rowId xmlns:a16="http://schemas.microsoft.com/office/drawing/2014/main" val="4093072226"/>
+                  </a:ext>
+                </a:extLst>
+              </a:tr>
+              <a:tr h="370840">
+                <a:tc>
+                  <a:txBody>
+                    <a:bodyPr/>
+                    <a:lstStyle/>
+                    <a:p>
+                      <a:pPr lvl="0">
+                        <a:buNone/>
+                      </a:pPr>
+                      <a:endParaRPr lang="en-US" sz="1800" b="0" i="0" u="none" strike="noStrike" noProof="0">
+                        <a:solidFill>
+                          <a:schemeClr val="accent6"/>
+                        </a:solidFill>
+                        <a:latin typeface="Calibri"/>
+                      </a:endParaRPr>
+                    </a:p>
+                  </a:txBody>
+                  <a:tcPr/>
+                </a:tc>
+                <a:tc>
+                  <a:txBody>
+                    <a:bodyPr/>
+                    <a:lstStyle/>
+                    <a:p>
+                      <a:pPr lvl="0">
+                        <a:buNone/>
+                      </a:pPr>
+                      <a:r>
+                        <a:rPr lang="fr-FR" sz="1800" b="0" i="0" u="none" strike="noStrike" noProof="0">
+                          <a:solidFill>
+                            <a:schemeClr val="tx1"/>
+                          </a:solidFill>
+                          <a:latin typeface="Arial"/>
+                        </a:rPr>
+                        <a:t>Les matières 2I2D et SI ont une préparation en loge</a:t>
+                      </a:r>
+                      <a:endParaRPr lang="en-US">
+                        <a:solidFill>
+                          <a:schemeClr val="tx1"/>
+                        </a:solidFill>
+                        <a:latin typeface="Arial"/>
+                      </a:endParaRPr>
+                    </a:p>
+                  </a:txBody>
+                  <a:tcPr/>
+                </a:tc>
+                <a:extLst>
+                  <a:ext uri="{0D108BD9-81ED-4DB2-BD59-A6C34878D82A}">
+                    <a16:rowId xmlns:a16="http://schemas.microsoft.com/office/drawing/2014/main" val="32463339"/>
+                  </a:ext>
+                </a:extLst>
+              </a:tr>
+              <a:tr h="370840">
+                <a:tc>
+                  <a:txBody>
+                    <a:bodyPr/>
+                    <a:lstStyle/>
+                    <a:p>
+                      <a:pPr lvl="0">
+                        <a:buNone/>
+                      </a:pPr>
+                      <a:endParaRPr lang="en-US" sz="1800" b="0" i="0" u="none" strike="noStrike" noProof="0">
+                        <a:solidFill>
+                          <a:schemeClr val="accent6"/>
+                        </a:solidFill>
+                        <a:latin typeface="Calibri"/>
+                      </a:endParaRPr>
+                    </a:p>
+                  </a:txBody>
+                  <a:tcPr/>
+                </a:tc>
+                <a:tc>
+                  <a:txBody>
+                    <a:bodyPr/>
+                    <a:lstStyle/>
+                    <a:p>
+                      <a:pPr lvl="0">
+                        <a:buNone/>
+                      </a:pPr>
+                      <a:r>
+                        <a:rPr lang="fr-FR" sz="1800" b="0" i="0" u="none" strike="noStrike" noProof="0">
+                          <a:solidFill>
+                            <a:schemeClr val="tx1"/>
+                          </a:solidFill>
+                          <a:latin typeface="Arial"/>
+                        </a:rPr>
+                        <a:t>Les candidats de la séries STI2D passent en premier</a:t>
+                      </a:r>
+                      <a:endParaRPr lang="en-US">
+                        <a:solidFill>
+                          <a:schemeClr val="tx1"/>
+                        </a:solidFill>
+                        <a:latin typeface="Arial"/>
+                      </a:endParaRPr>
+                    </a:p>
+                  </a:txBody>
+                  <a:tcPr/>
+                </a:tc>
+                <a:extLst>
+                  <a:ext uri="{0D108BD9-81ED-4DB2-BD59-A6C34878D82A}">
+                    <a16:rowId xmlns:a16="http://schemas.microsoft.com/office/drawing/2014/main" val="220663701"/>
+                  </a:ext>
+                </a:extLst>
+              </a:tr>
+              <a:tr h="370840">
+                <a:tc>
+                  <a:txBody>
+                    <a:bodyPr/>
+                    <a:lstStyle/>
+                    <a:p>
+                      <a:pPr lvl="0">
+                        <a:buNone/>
+                      </a:pPr>
+                      <a:endParaRPr lang="en-US" sz="1800" b="0" i="0" u="none" strike="noStrike" noProof="0">
+                        <a:solidFill>
+                          <a:schemeClr val="accent6"/>
+                        </a:solidFill>
+                        <a:latin typeface="Calibri"/>
+                      </a:endParaRPr>
+                    </a:p>
+                  </a:txBody>
+                  <a:tcPr/>
+                </a:tc>
+                <a:tc>
+                  <a:txBody>
+                    <a:bodyPr/>
+                    <a:lstStyle/>
+                    <a:p>
+                      <a:pPr lvl="0">
+                        <a:buNone/>
+                      </a:pPr>
+                      <a:r>
+                        <a:rPr lang="fr-FR" sz="1800" b="0" i="0" u="none" strike="noStrike" noProof="0">
+                          <a:solidFill>
+                            <a:schemeClr val="tx1"/>
+                          </a:solidFill>
+                          <a:latin typeface="Arial"/>
+                        </a:rPr>
+                        <a:t>On ne mélanges pas des candidats de série différente</a:t>
+                      </a:r>
+                      <a:endParaRPr lang="en-US">
+                        <a:solidFill>
+                          <a:schemeClr val="tx1"/>
+                        </a:solidFill>
+                        <a:latin typeface="Arial"/>
+                      </a:endParaRPr>
+                    </a:p>
+                  </a:txBody>
+                  <a:tcPr/>
+                </a:tc>
+                <a:extLst>
+                  <a:ext uri="{0D108BD9-81ED-4DB2-BD59-A6C34878D82A}">
+                    <a16:rowId xmlns:a16="http://schemas.microsoft.com/office/drawing/2014/main" val="922188520"/>
+                  </a:ext>
+                </a:extLst>
+              </a:tr>
+              <a:tr h="370840">
+                <a:tc>
+                  <a:txBody>
+                    <a:bodyPr/>
+                    <a:lstStyle/>
+                    <a:p>
+                      <a:pPr lvl="0">
+                        <a:buNone/>
+                      </a:pPr>
+                      <a:endParaRPr lang="en-US" sz="1800" b="0" i="0" u="none" strike="noStrike" noProof="0">
+                        <a:solidFill>
+                          <a:schemeClr val="accent6"/>
+                        </a:solidFill>
+                        <a:latin typeface="Calibri"/>
+                      </a:endParaRPr>
+                    </a:p>
+                  </a:txBody>
+                  <a:tcPr/>
+                </a:tc>
+                <a:tc>
+                  <a:txBody>
+                    <a:bodyPr/>
+                    <a:lstStyle/>
+                    <a:p>
+                      <a:pPr marL="0" marR="0" lvl="0" indent="0" algn="l">
+                        <a:lnSpc>
+                          <a:spcPct val="100000"/>
+                        </a:lnSpc>
+                        <a:spcBef>
+                          <a:spcPts val="0"/>
+                        </a:spcBef>
+                        <a:spcAft>
+                          <a:spcPts val="0"/>
+                        </a:spcAft>
+                        <a:buClr>
+                          <a:srgbClr val="000000"/>
+                        </a:buClr>
+                        <a:buNone/>
+                      </a:pPr>
+                      <a:r>
+                        <a:rPr lang="fr-FR" sz="1800" b="0" i="0" u="none" strike="noStrike" noProof="0">
+                          <a:solidFill>
+                            <a:schemeClr val="tx1"/>
+                          </a:solidFill>
+                          <a:latin typeface="Arial"/>
+                        </a:rPr>
+                        <a:t>La matière Math/Physique des STI2D se passe en présence de deux professeurs</a:t>
+                      </a:r>
+                      <a:endParaRPr lang="en-US" sz="1800" b="0" i="0" u="none" strike="noStrike" noProof="0">
+                        <a:solidFill>
+                          <a:schemeClr val="tx1"/>
+                        </a:solidFill>
+                        <a:latin typeface="Arial"/>
+                      </a:endParaRPr>
+                    </a:p>
+                  </a:txBody>
+                  <a:tcPr/>
+                </a:tc>
+                <a:extLst>
+                  <a:ext uri="{0D108BD9-81ED-4DB2-BD59-A6C34878D82A}">
+                    <a16:rowId xmlns:a16="http://schemas.microsoft.com/office/drawing/2014/main" val="2968187026"/>
+                  </a:ext>
+                </a:extLst>
+              </a:tr>
+              <a:tr h="370839">
+                <a:tc>
+                  <a:txBody>
+                    <a:bodyPr/>
+                    <a:lstStyle/>
+                    <a:p>
+                      <a:pPr lvl="0">
+                        <a:buNone/>
+                      </a:pPr>
+                      <a:endParaRPr lang="en-US" sz="1800" b="0" i="0" u="none" strike="noStrike" noProof="0">
+                        <a:solidFill>
+                          <a:schemeClr val="accent6"/>
+                        </a:solidFill>
+                        <a:latin typeface="Calibri"/>
+                      </a:endParaRPr>
+                    </a:p>
+                  </a:txBody>
+                  <a:tcPr/>
+                </a:tc>
+                <a:tc>
+                  <a:txBody>
+                    <a:bodyPr/>
+                    <a:lstStyle/>
+                    <a:p>
+                      <a:pPr marL="0" marR="0" lvl="0" indent="0" algn="l">
+                        <a:lnSpc>
+                          <a:spcPct val="100000"/>
+                        </a:lnSpc>
+                        <a:spcBef>
+                          <a:spcPts val="0"/>
+                        </a:spcBef>
+                        <a:spcAft>
+                          <a:spcPts val="0"/>
+                        </a:spcAft>
+                        <a:buClr>
+                          <a:srgbClr val="000000"/>
+                        </a:buClr>
+                        <a:buNone/>
+                      </a:pPr>
+                      <a:r>
+                        <a:rPr lang="fr-FR" sz="1800" b="0" i="0" u="none" strike="noStrike" noProof="0">
+                          <a:solidFill>
+                            <a:schemeClr val="tx1"/>
+                          </a:solidFill>
+                          <a:latin typeface="Arial"/>
+                        </a:rPr>
+                        <a:t>Les élèves n’ont pas accès aux nom de leur professeurs assignés</a:t>
+                      </a:r>
+                      <a:endParaRPr lang="en-US" sz="1800" b="0" i="0" u="none" strike="noStrike" noProof="0">
+                        <a:solidFill>
+                          <a:schemeClr val="tx1"/>
+                        </a:solidFill>
+                        <a:latin typeface="Arial"/>
+                      </a:endParaRPr>
+                    </a:p>
+                  </a:txBody>
+                  <a:tcPr/>
+                </a:tc>
+                <a:extLst>
+                  <a:ext uri="{0D108BD9-81ED-4DB2-BD59-A6C34878D82A}">
+                    <a16:rowId xmlns:a16="http://schemas.microsoft.com/office/drawing/2014/main" val="3507428317"/>
+                  </a:ext>
+                </a:extLst>
+              </a:tr>
+              <a:tr h="370838">
+                <a:tc>
+                  <a:txBody>
+                    <a:bodyPr/>
+                    <a:lstStyle/>
+                    <a:p>
+                      <a:pPr lvl="0">
+                        <a:buNone/>
+                      </a:pPr>
+                      <a:endParaRPr lang="en-US" sz="1800" b="0" i="0" u="none" strike="noStrike" noProof="0">
+                        <a:solidFill>
+                          <a:schemeClr val="accent6"/>
+                        </a:solidFill>
+                        <a:latin typeface="Calibri"/>
+                      </a:endParaRPr>
+                    </a:p>
+                  </a:txBody>
+                  <a:tcPr/>
+                </a:tc>
+                <a:tc>
+                  <a:txBody>
+                    <a:bodyPr/>
+                    <a:lstStyle/>
+                    <a:p>
+                      <a:pPr marL="0" marR="0" lvl="0" indent="0" algn="l">
+                        <a:lnSpc>
+                          <a:spcPct val="100000"/>
+                        </a:lnSpc>
+                        <a:spcBef>
+                          <a:spcPts val="0"/>
+                        </a:spcBef>
+                        <a:spcAft>
+                          <a:spcPts val="0"/>
+                        </a:spcAft>
+                        <a:buClr>
+                          <a:srgbClr val="000000"/>
+                        </a:buClr>
+                        <a:buNone/>
+                      </a:pPr>
+                      <a:r>
+                        <a:rPr lang="fr-FR" sz="1800" b="0" i="0" u="none" strike="noStrike" noProof="0">
+                          <a:solidFill>
+                            <a:schemeClr val="tx1"/>
+                          </a:solidFill>
+                          <a:latin typeface="Arial"/>
+                        </a:rPr>
+                        <a:t>Chaque salle dispose d’une feuille d’émargement générée automatiquement</a:t>
+                      </a:r>
+                      <a:endParaRPr lang="en-US" sz="1800" b="0" i="0" u="none" strike="noStrike" noProof="0">
+                        <a:solidFill>
+                          <a:schemeClr val="tx1"/>
+                        </a:solidFill>
+                        <a:latin typeface="Arial"/>
+                      </a:endParaRPr>
+                    </a:p>
+                  </a:txBody>
+                  <a:tcPr/>
+                </a:tc>
+                <a:extLst>
+                  <a:ext uri="{0D108BD9-81ED-4DB2-BD59-A6C34878D82A}">
+                    <a16:rowId xmlns:a16="http://schemas.microsoft.com/office/drawing/2014/main" val="1855614412"/>
+                  </a:ext>
+                </a:extLst>
+              </a:tr>
+              <a:tr h="370838">
+                <a:tc>
+                  <a:txBody>
+                    <a:bodyPr/>
+                    <a:lstStyle/>
+                    <a:p>
+                      <a:pPr lvl="0">
+                        <a:buNone/>
+                      </a:pPr>
+                      <a:endParaRPr lang="en-US" sz="1800" b="0" i="0" u="none" strike="noStrike" noProof="0">
+                        <a:solidFill>
+                          <a:schemeClr val="accent6"/>
+                        </a:solidFill>
+                        <a:latin typeface="Calibri"/>
+                      </a:endParaRPr>
+                    </a:p>
+                  </a:txBody>
+                  <a:tcPr/>
+                </a:tc>
+                <a:tc>
+                  <a:txBody>
+                    <a:bodyPr/>
+                    <a:lstStyle/>
+                    <a:p>
+                      <a:pPr marL="0" marR="0" lvl="0" indent="0" algn="l">
+                        <a:lnSpc>
+                          <a:spcPct val="100000"/>
+                        </a:lnSpc>
+                        <a:spcBef>
+                          <a:spcPts val="0"/>
+                        </a:spcBef>
+                        <a:spcAft>
+                          <a:spcPts val="0"/>
+                        </a:spcAft>
+                        <a:buClr>
+                          <a:srgbClr val="000000"/>
+                        </a:buClr>
+                        <a:buNone/>
+                      </a:pPr>
+                      <a:r>
+                        <a:rPr lang="fr-FR" sz="1800" b="0" i="0" u="none" strike="noStrike" noProof="0">
+                          <a:solidFill>
+                            <a:schemeClr val="tx1"/>
+                          </a:solidFill>
+                          <a:latin typeface="Arial"/>
+                        </a:rPr>
+                        <a:t>L’accès au compte administrateur se fait à l’aide d’identifiants sécurisés</a:t>
+                      </a:r>
+                      <a:endParaRPr lang="en-US" sz="1800" b="0" i="0" u="none" strike="noStrike" noProof="0">
+                        <a:solidFill>
+                          <a:schemeClr val="tx1"/>
+                        </a:solidFill>
+                        <a:latin typeface="Arial"/>
+                      </a:endParaRPr>
+                    </a:p>
+                  </a:txBody>
+                  <a:tcPr/>
+                </a:tc>
+                <a:extLst>
+                  <a:ext uri="{0D108BD9-81ED-4DB2-BD59-A6C34878D82A}">
+                    <a16:rowId xmlns:a16="http://schemas.microsoft.com/office/drawing/2014/main" val="1625010738"/>
+                  </a:ext>
+                </a:extLst>
+              </a:tr>
+              <a:tr h="370838">
+                <a:tc>
+                  <a:txBody>
+                    <a:bodyPr/>
+                    <a:lstStyle/>
+                    <a:p>
+                      <a:pPr lvl="0">
+                        <a:buNone/>
+                      </a:pPr>
+                      <a:endParaRPr lang="en-US" sz="1800" b="0" i="0" u="none" strike="noStrike" noProof="0">
+                        <a:solidFill>
+                          <a:schemeClr val="accent6"/>
+                        </a:solidFill>
+                        <a:latin typeface="Calibri"/>
+                      </a:endParaRPr>
+                    </a:p>
+                  </a:txBody>
+                  <a:tcPr/>
+                </a:tc>
+                <a:tc>
+                  <a:txBody>
+                    <a:bodyPr/>
+                    <a:lstStyle/>
+                    <a:p>
+                      <a:pPr marL="0" lvl="0" indent="0" algn="l">
+                        <a:lnSpc>
+                          <a:spcPct val="100000"/>
+                        </a:lnSpc>
+                        <a:spcBef>
+                          <a:spcPts val="0"/>
+                        </a:spcBef>
+                        <a:spcAft>
+                          <a:spcPts val="0"/>
+                        </a:spcAft>
+                        <a:buNone/>
+                      </a:pPr>
+                      <a:r>
+                        <a:rPr lang="fr-FR" sz="1800" b="0" i="0" u="none" strike="noStrike" noProof="0">
+                          <a:solidFill>
+                            <a:schemeClr val="tx1"/>
+                          </a:solidFill>
+                          <a:latin typeface="Arial"/>
+                        </a:rPr>
+                        <a:t>Un professeur dispose d’un accès à son emplois du temps</a:t>
+                      </a:r>
+                    </a:p>
+                  </a:txBody>
+                  <a:tcPr/>
+                </a:tc>
+                <a:extLst>
+                  <a:ext uri="{0D108BD9-81ED-4DB2-BD59-A6C34878D82A}">
+                    <a16:rowId xmlns:a16="http://schemas.microsoft.com/office/drawing/2014/main" val="3256662305"/>
+                  </a:ext>
+                </a:extLst>
+              </a:tr>
+              <a:tr h="370838">
+                <a:tc>
+                  <a:txBody>
+                    <a:bodyPr/>
+                    <a:lstStyle/>
+                    <a:p>
+                      <a:pPr lvl="0">
+                        <a:buNone/>
+                      </a:pPr>
+                      <a:endParaRPr lang="en-US" sz="1800" b="0" i="0" u="none" strike="noStrike" noProof="0">
+                        <a:solidFill>
+                          <a:schemeClr val="accent6"/>
+                        </a:solidFill>
+                        <a:latin typeface="Calibri"/>
+                      </a:endParaRPr>
+                    </a:p>
+                  </a:txBody>
+                  <a:tcPr/>
+                </a:tc>
+                <a:tc>
+                  <a:txBody>
+                    <a:bodyPr/>
+                    <a:lstStyle/>
+                    <a:p>
+                      <a:pPr marL="0" lvl="0" indent="0" algn="l">
+                        <a:lnSpc>
+                          <a:spcPct val="100000"/>
+                        </a:lnSpc>
+                        <a:spcBef>
+                          <a:spcPts val="0"/>
+                        </a:spcBef>
+                        <a:spcAft>
+                          <a:spcPts val="0"/>
+                        </a:spcAft>
+                        <a:buNone/>
+                      </a:pPr>
+                      <a:r>
+                        <a:rPr lang="fr-FR" sz="1800" b="0" i="0" u="none" strike="noStrike" noProof="0">
+                          <a:solidFill>
+                            <a:schemeClr val="tx1"/>
+                          </a:solidFill>
+                          <a:latin typeface="Arial"/>
+                        </a:rPr>
+                        <a:t>Le calendrier général seras accessible publiquement</a:t>
+                      </a:r>
+                      <a:endParaRPr lang="en-US">
+                        <a:solidFill>
+                          <a:schemeClr val="tx1"/>
+                        </a:solidFill>
+                        <a:latin typeface="Arial"/>
+                      </a:endParaRPr>
+                    </a:p>
+                  </a:txBody>
+                  <a:tcPr/>
+                </a:tc>
+                <a:extLst>
+                  <a:ext uri="{0D108BD9-81ED-4DB2-BD59-A6C34878D82A}">
+                    <a16:rowId xmlns:a16="http://schemas.microsoft.com/office/drawing/2014/main" val="1486000678"/>
+                  </a:ext>
+                </a:extLst>
+              </a:tr>
+              <a:tr h="370838">
+                <a:tc>
+                  <a:txBody>
+                    <a:bodyPr/>
+                    <a:lstStyle/>
+                    <a:p>
+                      <a:pPr lvl="0">
+                        <a:buNone/>
+                      </a:pPr>
+                      <a:endParaRPr lang="en-US" sz="1800" b="0" i="0" u="none" strike="noStrike" noProof="0">
+                        <a:solidFill>
+                          <a:schemeClr val="accent6"/>
+                        </a:solidFill>
+                        <a:latin typeface="Calibri"/>
+                      </a:endParaRPr>
+                    </a:p>
+                  </a:txBody>
+                  <a:tcPr/>
+                </a:tc>
+                <a:tc>
+                  <a:txBody>
+                    <a:bodyPr/>
+                    <a:lstStyle/>
+                    <a:p>
+                      <a:pPr marL="0" lvl="0" indent="0" algn="l">
+                        <a:lnSpc>
+                          <a:spcPct val="100000"/>
+                        </a:lnSpc>
+                        <a:spcBef>
+                          <a:spcPts val="0"/>
+                        </a:spcBef>
+                        <a:spcAft>
+                          <a:spcPts val="0"/>
+                        </a:spcAft>
+                        <a:buNone/>
+                      </a:pPr>
+                      <a:r>
+                        <a:rPr lang="fr-FR" sz="1800" b="0" i="0" u="none" strike="noStrike" noProof="0">
+                          <a:solidFill>
+                            <a:schemeClr val="tx1"/>
+                          </a:solidFill>
+                          <a:latin typeface="Arial"/>
+                        </a:rPr>
+                        <a:t>Il faut avoir la possibilité d’obtenir la base de donnée au format Excel</a:t>
+                      </a:r>
+                      <a:endParaRPr lang="en-US">
+                        <a:solidFill>
+                          <a:schemeClr val="tx1"/>
+                        </a:solidFill>
+                        <a:latin typeface="Arial"/>
+                      </a:endParaRPr>
+                    </a:p>
+                  </a:txBody>
+                  <a:tcPr/>
+                </a:tc>
+                <a:extLst>
+                  <a:ext uri="{0D108BD9-81ED-4DB2-BD59-A6C34878D82A}">
+                    <a16:rowId xmlns:a16="http://schemas.microsoft.com/office/drawing/2014/main" val="3679645505"/>
+                  </a:ext>
+                </a:extLst>
+              </a:tr>
+            </a:tbl>
+          </a:graphicData>
+        </a:graphic>
+      </p:graphicFrame>
+      <p:sp>
+        <p:nvSpPr>
+          <p:cNvPr id="5" name="TextBox 4">
+            <a:extLst>
+              <a:ext uri="{FF2B5EF4-FFF2-40B4-BE49-F238E27FC236}">
+                <a16:creationId xmlns:a16="http://schemas.microsoft.com/office/drawing/2014/main" id="{91EDAF69-76AD-4516-8612-382F3AF4AF8D}"/>
               </a:ext>
             </a:extLst>
           </p:cNvPr>
@@ -4225,8 +5139,8 @@
         </p:nvSpPr>
         <p:spPr>
           <a:xfrm>
-            <a:off x="1608338" y="1873188"/>
-            <a:ext cx="8975324" cy="3293209"/>
+            <a:off x="1732157" y="170986"/>
+            <a:ext cx="6989956" cy="430887"/>
           </a:xfrm>
           <a:prstGeom prst="rect">
             <a:avLst/>
@@ -4234,204 +5148,30 @@
           <a:noFill/>
         </p:spPr>
         <p:txBody>
-          <a:bodyPr wrap="square" numCol="1" rtlCol="0">
+          <a:bodyPr rot="0" spcFirstLastPara="0" vertOverflow="overflow" horzOverflow="overflow" vert="horz" wrap="square" lIns="91440" tIns="45720" rIns="91440" bIns="45720" numCol="1" spcCol="0" rtlCol="0" fromWordArt="0" anchor="t" anchorCtr="0" forceAA="0" compatLnSpc="1">
+            <a:prstTxWarp prst="textNoShape">
+              <a:avLst/>
+            </a:prstTxWarp>
             <a:spAutoFit/>
           </a:bodyPr>
           <a:lstStyle/>
           <a:p>
-            <a:pPr marL="285750" indent="-285750">
-              <a:buFont typeface="Wingdings" panose="05000000000000000000" pitchFamily="2" charset="2"/>
-              <a:buChar char="q"/>
-            </a:pPr>
-            <a:r>
-              <a:rPr lang="fr-FR" sz="1600" dirty="0">
+            <a:r>
+              <a:rPr lang="fr-FR" sz="2200" b="1">
                 <a:solidFill>
-                  <a:schemeClr val="bg1"/>
+                  <a:srgbClr val="FFFFFF"/>
                 </a:solidFill>
-                <a:latin typeface="Futura" pitchFamily="50" charset="0"/>
+                <a:latin typeface="Comfortaa"/>
               </a:rPr>
-              <a:t>Les professeurs doivent manger entre 13h et 14h</a:t>
-            </a:r>
-          </a:p>
-          <a:p>
-            <a:pPr marL="285750" indent="-285750">
-              <a:buFont typeface="Wingdings" panose="05000000000000000000" pitchFamily="2" charset="2"/>
-              <a:buChar char="q"/>
-            </a:pPr>
-            <a:r>
-              <a:rPr lang="fr-FR" sz="1600" dirty="0">
-                <a:solidFill>
-                  <a:schemeClr val="bg1"/>
-                </a:solidFill>
-                <a:latin typeface="Futura" pitchFamily="50" charset="0"/>
+              <a:t>Etat de l’avancement du projet :</a:t>
+            </a:r>
+            <a:r>
+              <a:rPr lang="en-US" sz="2200">
+                <a:latin typeface="Comfortaa"/>
               </a:rPr>
-              <a:t>Après la génération du planning, pouvoir rajouter des créneaux</a:t>
-            </a:r>
-          </a:p>
-          <a:p>
-            <a:pPr marL="285750" indent="-285750">
-              <a:buFont typeface="Wingdings" panose="05000000000000000000" pitchFamily="2" charset="2"/>
-              <a:buChar char="q"/>
-            </a:pPr>
-            <a:r>
-              <a:rPr lang="fr-FR" sz="1600" dirty="0">
-                <a:solidFill>
-                  <a:schemeClr val="bg1"/>
-                </a:solidFill>
-                <a:latin typeface="Futura" pitchFamily="50" charset="0"/>
-              </a:rPr>
-              <a:t>Avoir un créneau vide toutes les 2h30 (5 x 30min)</a:t>
-            </a:r>
-          </a:p>
-          <a:p>
-            <a:pPr marL="285750" indent="-285750">
-              <a:buFont typeface="Wingdings" panose="05000000000000000000" pitchFamily="2" charset="2"/>
-              <a:buChar char="q"/>
-            </a:pPr>
-            <a:r>
-              <a:rPr lang="fr-FR" sz="1600" dirty="0">
-                <a:solidFill>
-                  <a:schemeClr val="bg1"/>
-                </a:solidFill>
-                <a:latin typeface="Futura" pitchFamily="50" charset="0"/>
-              </a:rPr>
-              <a:t>Les matières 2I2D et SI ont une préparation en loge</a:t>
-            </a:r>
-          </a:p>
-          <a:p>
-            <a:pPr marL="285750" indent="-285750">
-              <a:buFont typeface="Wingdings" panose="05000000000000000000" pitchFamily="2" charset="2"/>
-              <a:buChar char="q"/>
-            </a:pPr>
-            <a:r>
-              <a:rPr lang="fr-FR" sz="1600" dirty="0">
-                <a:solidFill>
-                  <a:schemeClr val="bg1"/>
-                </a:solidFill>
-                <a:latin typeface="Futura" pitchFamily="50" charset="0"/>
-              </a:rPr>
-              <a:t>Les candidats de la séries STI2D passent en premier</a:t>
-            </a:r>
-          </a:p>
-          <a:p>
-            <a:pPr marL="285750" indent="-285750">
-              <a:buFont typeface="Wingdings" panose="05000000000000000000" pitchFamily="2" charset="2"/>
-              <a:buChar char="q"/>
-            </a:pPr>
-            <a:r>
-              <a:rPr lang="fr-FR" sz="1600" dirty="0">
-                <a:solidFill>
-                  <a:schemeClr val="bg1"/>
-                </a:solidFill>
-                <a:latin typeface="Futura" pitchFamily="50" charset="0"/>
-              </a:rPr>
-              <a:t>On ne mélanges pas des candidats de série différente</a:t>
-            </a:r>
-          </a:p>
-          <a:p>
-            <a:pPr marL="285750" indent="-285750">
-              <a:buFont typeface="Wingdings" panose="05000000000000000000" pitchFamily="2" charset="2"/>
-              <a:buChar char="q"/>
-            </a:pPr>
-            <a:r>
-              <a:rPr lang="fr-FR" sz="1600" dirty="0">
-                <a:solidFill>
-                  <a:schemeClr val="bg1"/>
-                </a:solidFill>
-                <a:latin typeface="Futura" pitchFamily="50" charset="0"/>
-              </a:rPr>
-              <a:t>La matière Math/Physique des STI2D se passe en présence de deux professeurs</a:t>
-            </a:r>
-          </a:p>
-          <a:p>
-            <a:pPr marL="285750" indent="-285750">
-              <a:buFont typeface="Wingdings" panose="05000000000000000000" pitchFamily="2" charset="2"/>
-              <a:buChar char="q"/>
-            </a:pPr>
-            <a:r>
-              <a:rPr lang="fr-FR" sz="1600" dirty="0">
-                <a:solidFill>
-                  <a:schemeClr val="bg1"/>
-                </a:solidFill>
-                <a:latin typeface="Futura" pitchFamily="50" charset="0"/>
-              </a:rPr>
-              <a:t>Les élèves n’ont pas accès aux nom de leur professeurs assignés</a:t>
-            </a:r>
-          </a:p>
-          <a:p>
-            <a:pPr marL="285750" indent="-285750">
-              <a:buFont typeface="Wingdings" panose="05000000000000000000" pitchFamily="2" charset="2"/>
-              <a:buChar char="q"/>
-            </a:pPr>
-            <a:r>
-              <a:rPr lang="fr-FR" sz="1600" dirty="0">
-                <a:solidFill>
-                  <a:schemeClr val="bg1"/>
-                </a:solidFill>
-                <a:latin typeface="Futura" pitchFamily="50" charset="0"/>
-              </a:rPr>
-              <a:t>Chaque salle dispose d’une feuille d’émargement générée automatiquement</a:t>
-            </a:r>
-          </a:p>
-          <a:p>
-            <a:pPr marL="285750" indent="-285750">
-              <a:buFont typeface="Wingdings" panose="05000000000000000000" pitchFamily="2" charset="2"/>
-              <a:buChar char="q"/>
-            </a:pPr>
-            <a:r>
-              <a:rPr lang="fr-FR" sz="1600" dirty="0">
-                <a:solidFill>
-                  <a:schemeClr val="bg1"/>
-                </a:solidFill>
-                <a:latin typeface="Futura" pitchFamily="50" charset="0"/>
-              </a:rPr>
-              <a:t>L’accès au compte administrateur se fait à l’aide d’identifiants sécurisés</a:t>
-            </a:r>
-          </a:p>
-          <a:p>
-            <a:pPr marL="285750" indent="-285750">
-              <a:buFont typeface="Wingdings" panose="05000000000000000000" pitchFamily="2" charset="2"/>
-              <a:buChar char="q"/>
-            </a:pPr>
-            <a:r>
-              <a:rPr lang="fr-FR" sz="1600" dirty="0">
-                <a:solidFill>
-                  <a:schemeClr val="bg1"/>
-                </a:solidFill>
-                <a:latin typeface="Futura" pitchFamily="50" charset="0"/>
-              </a:rPr>
-              <a:t>Un professeur dispose d’un accès à son emplois du temps</a:t>
-            </a:r>
-          </a:p>
-          <a:p>
-            <a:pPr marL="285750" indent="-285750">
-              <a:buFont typeface="Wingdings" panose="05000000000000000000" pitchFamily="2" charset="2"/>
-              <a:buChar char="q"/>
-            </a:pPr>
-            <a:r>
-              <a:rPr lang="fr-FR" sz="1600" dirty="0">
-                <a:solidFill>
-                  <a:schemeClr val="bg1"/>
-                </a:solidFill>
-                <a:latin typeface="Futura" pitchFamily="50" charset="0"/>
-              </a:rPr>
-              <a:t>Le calendrier général seras accessible publiquement</a:t>
-            </a:r>
-          </a:p>
-          <a:p>
-            <a:pPr marL="285750" indent="-285750">
-              <a:buFont typeface="Wingdings" panose="05000000000000000000" pitchFamily="2" charset="2"/>
-              <a:buChar char="q"/>
-            </a:pPr>
-            <a:r>
-              <a:rPr lang="fr-FR" sz="1600" dirty="0">
-                <a:solidFill>
-                  <a:schemeClr val="bg1"/>
-                </a:solidFill>
-                <a:latin typeface="Futura" pitchFamily="50" charset="0"/>
-              </a:rPr>
-              <a:t>Il faut avoir la possibilité d’obtenir la base de donnée au format Excel</a:t>
-            </a:r>
+              <a:t>​</a:t>
+            </a:r>
+            <a:endParaRPr lang="en-US" sz="2200"/>
           </a:p>
         </p:txBody>
       </p:sp>
@@ -4479,7 +5219,7 @@
         </p:nvSpPr>
         <p:spPr>
           <a:xfrm>
-            <a:off x="417250" y="399495"/>
+            <a:off x="330659" y="79109"/>
             <a:ext cx="9694415" cy="830997"/>
           </a:xfrm>
           <a:prstGeom prst="rect">
@@ -4494,7 +5234,7 @@
           <a:lstStyle/>
           <a:p>
             <a:r>
-              <a:rPr lang="fr-FR" sz="2400" b="1" dirty="0">
+              <a:rPr lang="fr-FR" sz="2400" b="1">
                 <a:solidFill>
                   <a:schemeClr val="bg1"/>
                 </a:solidFill>
@@ -4504,234 +5244,917 @@
             </a:r>
           </a:p>
           <a:p>
-            <a:endParaRPr lang="fr-FR" sz="2400" b="1" dirty="0"/>
-          </a:p>
-        </p:txBody>
-      </p:sp>
-      <p:sp>
-        <p:nvSpPr>
-          <p:cNvPr id="3" name="ZoneTexte 2">
-            <a:extLst>
-              <a:ext uri="{FF2B5EF4-FFF2-40B4-BE49-F238E27FC236}">
-                <a16:creationId xmlns:a16="http://schemas.microsoft.com/office/drawing/2014/main" id="{FCC3E8AE-BB0E-419D-8C29-7BF50626EEE3}"/>
-              </a:ext>
-            </a:extLst>
-          </p:cNvPr>
-          <p:cNvSpPr txBox="1"/>
-          <p:nvPr/>
-        </p:nvSpPr>
-        <p:spPr>
-          <a:xfrm>
-            <a:off x="1608338" y="1873188"/>
-            <a:ext cx="8975324" cy="3293209"/>
-          </a:xfrm>
-          <a:prstGeom prst="rect">
-            <a:avLst/>
-          </a:prstGeom>
-          <a:noFill/>
-        </p:spPr>
-        <p:txBody>
-          <a:bodyPr wrap="square" numCol="1" rtlCol="0">
-            <a:spAutoFit/>
-          </a:bodyPr>
-          <a:lstStyle/>
-          <a:p>
-            <a:pPr marL="285750" indent="-285750">
-              <a:buFont typeface="Wingdings" panose="05000000000000000000" pitchFamily="2" charset="2"/>
-              <a:buChar char="ü"/>
-            </a:pPr>
-            <a:r>
-              <a:rPr lang="fr-FR" sz="1600" dirty="0">
-                <a:solidFill>
-                  <a:schemeClr val="bg1"/>
-                </a:solidFill>
-                <a:latin typeface="Futura" pitchFamily="50" charset="0"/>
-              </a:rPr>
-              <a:t>Les professeurs doivent manger entre 13h et 14h</a:t>
-            </a:r>
-          </a:p>
-          <a:p>
-            <a:pPr marL="285750" indent="-285750">
-              <a:buFont typeface="Wingdings" panose="05000000000000000000" pitchFamily="2" charset="2"/>
-              <a:buChar char="ü"/>
-            </a:pPr>
-            <a:r>
-              <a:rPr lang="fr-FR" sz="1600" dirty="0">
-                <a:solidFill>
-                  <a:schemeClr val="bg1"/>
-                </a:solidFill>
-                <a:latin typeface="Futura" pitchFamily="50" charset="0"/>
-              </a:rPr>
-              <a:t>Après la génération du planning, pouvoir rajouter des créneaux</a:t>
-            </a:r>
-          </a:p>
-          <a:p>
-            <a:pPr marL="285750" indent="-285750">
-              <a:buFont typeface="Wingdings" panose="05000000000000000000" pitchFamily="2" charset="2"/>
-              <a:buChar char="ü"/>
-            </a:pPr>
-            <a:r>
-              <a:rPr lang="fr-FR" sz="1600" dirty="0">
-                <a:solidFill>
-                  <a:schemeClr val="bg1"/>
-                </a:solidFill>
-                <a:latin typeface="Futura" pitchFamily="50" charset="0"/>
-              </a:rPr>
-              <a:t>Avoir un créneau vide toutes les 2h30 (5 x 30min)</a:t>
-            </a:r>
-          </a:p>
-          <a:p>
-            <a:pPr marL="285750" indent="-285750">
-              <a:buFont typeface="Wingdings" panose="05000000000000000000" pitchFamily="2" charset="2"/>
-              <a:buChar char="ü"/>
-            </a:pPr>
-            <a:r>
-              <a:rPr lang="fr-FR" sz="1600" dirty="0">
-                <a:solidFill>
-                  <a:schemeClr val="bg1"/>
-                </a:solidFill>
-                <a:latin typeface="Futura" pitchFamily="50" charset="0"/>
-              </a:rPr>
-              <a:t>Les matières 2I2D et SI ont une préparation en loge</a:t>
-            </a:r>
-          </a:p>
-          <a:p>
-            <a:pPr marL="285750" indent="-285750">
-              <a:buFont typeface="Wingdings" panose="05000000000000000000" pitchFamily="2" charset="2"/>
-              <a:buChar char="ü"/>
-            </a:pPr>
-            <a:r>
-              <a:rPr lang="fr-FR" sz="1600" dirty="0">
-                <a:solidFill>
-                  <a:schemeClr val="bg1"/>
-                </a:solidFill>
-                <a:latin typeface="Futura" pitchFamily="50" charset="0"/>
-              </a:rPr>
-              <a:t>Les candidats de la séries STI2D passent en premier</a:t>
-            </a:r>
-          </a:p>
-          <a:p>
-            <a:pPr marL="285750" indent="-285750">
-              <a:buFont typeface="Wingdings" panose="05000000000000000000" pitchFamily="2" charset="2"/>
-              <a:buChar char="ü"/>
-            </a:pPr>
-            <a:r>
-              <a:rPr lang="fr-FR" sz="1600" dirty="0">
-                <a:solidFill>
-                  <a:schemeClr val="bg1"/>
-                </a:solidFill>
-                <a:latin typeface="Futura" pitchFamily="50" charset="0"/>
-              </a:rPr>
-              <a:t>On ne mélanges pas des candidats de série différente</a:t>
-            </a:r>
-          </a:p>
-          <a:p>
-            <a:pPr marL="285750" indent="-285750">
-              <a:buFont typeface="Wingdings" panose="05000000000000000000" pitchFamily="2" charset="2"/>
-              <a:buChar char="ü"/>
-            </a:pPr>
-            <a:r>
-              <a:rPr lang="fr-FR" sz="1600" dirty="0">
-                <a:solidFill>
-                  <a:schemeClr val="bg1"/>
-                </a:solidFill>
-                <a:latin typeface="Futura" pitchFamily="50" charset="0"/>
-              </a:rPr>
-              <a:t>La matière Math/Physique des STI2D se passe en présence de deux professeurs</a:t>
-            </a:r>
-          </a:p>
-          <a:p>
-            <a:pPr marL="285750" indent="-285750">
-              <a:buFont typeface="Wingdings" panose="05000000000000000000" pitchFamily="2" charset="2"/>
-              <a:buChar char="ü"/>
-            </a:pPr>
-            <a:r>
-              <a:rPr lang="fr-FR" sz="1600" dirty="0">
-                <a:solidFill>
-                  <a:schemeClr val="bg1"/>
-                </a:solidFill>
-                <a:latin typeface="Futura" pitchFamily="50" charset="0"/>
-              </a:rPr>
-              <a:t>Les élèves n’ont pas accès aux nom de leur professeurs assignés</a:t>
-            </a:r>
-          </a:p>
-          <a:p>
-            <a:pPr marL="285750" indent="-285750">
-              <a:buFont typeface="Wingdings" panose="05000000000000000000" pitchFamily="2" charset="2"/>
-              <a:buChar char="ü"/>
-            </a:pPr>
-            <a:r>
-              <a:rPr lang="fr-FR" sz="1600" dirty="0">
-                <a:solidFill>
-                  <a:schemeClr val="bg1"/>
-                </a:solidFill>
-                <a:latin typeface="Futura" pitchFamily="50" charset="0"/>
-              </a:rPr>
-              <a:t>Chaque salle dispose d’une feuille d’émargement générée automatiquement</a:t>
-            </a:r>
-          </a:p>
-          <a:p>
-            <a:pPr marL="285750" indent="-285750">
-              <a:buFont typeface="Wingdings" panose="05000000000000000000" pitchFamily="2" charset="2"/>
-              <a:buChar char="ü"/>
-            </a:pPr>
-            <a:r>
-              <a:rPr lang="fr-FR" sz="1600" dirty="0">
-                <a:solidFill>
-                  <a:schemeClr val="bg1"/>
-                </a:solidFill>
-                <a:latin typeface="Futura" pitchFamily="50" charset="0"/>
-              </a:rPr>
-              <a:t>L’accès au compte administrateur se fait à l’aide d’identifiants sécurisés</a:t>
-            </a:r>
-          </a:p>
-          <a:p>
-            <a:pPr marL="285750" indent="-285750">
-              <a:buFont typeface="Wingdings" panose="05000000000000000000" pitchFamily="2" charset="2"/>
-              <a:buChar char="ü"/>
-            </a:pPr>
-            <a:r>
-              <a:rPr lang="fr-FR" sz="1600" dirty="0">
-                <a:solidFill>
-                  <a:schemeClr val="bg1"/>
-                </a:solidFill>
-                <a:latin typeface="Futura" pitchFamily="50" charset="0"/>
-              </a:rPr>
-              <a:t>Un professeur dispose d’un accès à son emplois du temps</a:t>
-            </a:r>
-          </a:p>
-          <a:p>
-            <a:pPr marL="285750" indent="-285750">
-              <a:buFont typeface="Wingdings" panose="05000000000000000000" pitchFamily="2" charset="2"/>
-              <a:buChar char="ü"/>
-            </a:pPr>
-            <a:r>
-              <a:rPr lang="fr-FR" sz="1600" dirty="0">
-                <a:solidFill>
-                  <a:schemeClr val="bg1"/>
-                </a:solidFill>
-                <a:latin typeface="Futura" pitchFamily="50" charset="0"/>
-              </a:rPr>
-              <a:t>Le calendrier général seras accessible publiquement</a:t>
-            </a:r>
-          </a:p>
-          <a:p>
-            <a:pPr marL="285750" indent="-285750">
-              <a:buFont typeface="Wingdings" panose="05000000000000000000" pitchFamily="2" charset="2"/>
-              <a:buChar char="ü"/>
-            </a:pPr>
-            <a:r>
-              <a:rPr lang="fr-FR" sz="1600" dirty="0">
-                <a:solidFill>
-                  <a:schemeClr val="bg1"/>
-                </a:solidFill>
-                <a:latin typeface="Futura" pitchFamily="50" charset="0"/>
-              </a:rPr>
-              <a:t>Il faut avoir la possibilité d’obtenir la base de donnée au format Excel</a:t>
-            </a:r>
-          </a:p>
-        </p:txBody>
-      </p:sp>
+            <a:endParaRPr lang="fr-FR" sz="2400" b="1"/>
+          </a:p>
+        </p:txBody>
+      </p:sp>
+      <p:graphicFrame>
+        <p:nvGraphicFramePr>
+          <p:cNvPr id="6" name="Table 4">
+            <a:extLst>
+              <a:ext uri="{FF2B5EF4-FFF2-40B4-BE49-F238E27FC236}">
+                <a16:creationId xmlns:a16="http://schemas.microsoft.com/office/drawing/2014/main" id="{FE59F89A-C57D-4207-87DE-C1AFC9C81146}"/>
+              </a:ext>
+            </a:extLst>
+          </p:cNvPr>
+          <p:cNvGraphicFramePr>
+            <a:graphicFrameLocks noGrp="1"/>
+          </p:cNvGraphicFramePr>
+          <p:nvPr>
+            <p:extLst>
+              <p:ext uri="{D42A27DB-BD31-4B8C-83A1-F6EECF244321}">
+                <p14:modId xmlns:p14="http://schemas.microsoft.com/office/powerpoint/2010/main" val="1777756024"/>
+              </p:ext>
+            </p:extLst>
+          </p:nvPr>
+        </p:nvGraphicFramePr>
+        <p:xfrm>
+          <a:off x="1858563" y="720476"/>
+          <a:ext cx="8168637" cy="5731731"/>
+        </p:xfrm>
+        <a:graphic>
+          <a:graphicData uri="http://schemas.openxmlformats.org/drawingml/2006/table">
+            <a:tbl>
+              <a:tblPr firstRow="1" bandRow="1">
+                <a:tableStyleId>{5C22544A-7EE6-4342-B048-85BDC9FD1C3A}</a:tableStyleId>
+              </a:tblPr>
+              <a:tblGrid>
+                <a:gridCol w="406977">
+                  <a:extLst>
+                    <a:ext uri="{9D8B030D-6E8A-4147-A177-3AD203B41FA5}">
+                      <a16:colId xmlns:a16="http://schemas.microsoft.com/office/drawing/2014/main" val="73613294"/>
+                    </a:ext>
+                  </a:extLst>
+                </a:gridCol>
+                <a:gridCol w="7761660">
+                  <a:extLst>
+                    <a:ext uri="{9D8B030D-6E8A-4147-A177-3AD203B41FA5}">
+                      <a16:colId xmlns:a16="http://schemas.microsoft.com/office/drawing/2014/main" val="1847866015"/>
+                    </a:ext>
+                  </a:extLst>
+                </a:gridCol>
+              </a:tblGrid>
+              <a:tr h="372340">
+                <a:tc>
+                  <a:txBody>
+                    <a:bodyPr/>
+                    <a:lstStyle/>
+                    <a:p>
+                      <a:endParaRPr lang="en-US">
+                        <a:solidFill>
+                          <a:schemeClr val="tx1"/>
+                        </a:solidFill>
+                      </a:endParaRPr>
+                    </a:p>
+                  </a:txBody>
+                  <a:tcPr/>
+                </a:tc>
+                <a:tc>
+                  <a:txBody>
+                    <a:bodyPr/>
+                    <a:lstStyle/>
+                    <a:p>
+                      <a:pPr lvl="0">
+                        <a:buNone/>
+                      </a:pPr>
+                      <a:r>
+                        <a:rPr lang="en-US" sz="1800" b="1" i="0" u="none" strike="noStrike" noProof="0" err="1">
+                          <a:solidFill>
+                            <a:schemeClr val="bg1"/>
+                          </a:solidFill>
+                          <a:latin typeface="Calibri"/>
+                        </a:rPr>
+                        <a:t>Tâches</a:t>
+                      </a:r>
+                      <a:r>
+                        <a:rPr lang="en-US" sz="1800" b="1" i="0" u="none" strike="noStrike" noProof="0">
+                          <a:solidFill>
+                            <a:schemeClr val="bg1"/>
+                          </a:solidFill>
+                          <a:latin typeface="Calibri"/>
+                        </a:rPr>
+                        <a:t> </a:t>
+                      </a:r>
+                      <a:r>
+                        <a:rPr lang="en-US" sz="1800" b="1" i="0" u="none" strike="noStrike" noProof="0" err="1">
+                          <a:solidFill>
+                            <a:schemeClr val="bg1"/>
+                          </a:solidFill>
+                          <a:latin typeface="Calibri"/>
+                        </a:rPr>
+                        <a:t>accomplies</a:t>
+                      </a:r>
+                    </a:p>
+                  </a:txBody>
+                  <a:tcPr/>
+                </a:tc>
+                <a:extLst>
+                  <a:ext uri="{0D108BD9-81ED-4DB2-BD59-A6C34878D82A}">
+                    <a16:rowId xmlns:a16="http://schemas.microsoft.com/office/drawing/2014/main" val="3542665727"/>
+                  </a:ext>
+                </a:extLst>
+              </a:tr>
+              <a:tr h="370840">
+                <a:tc>
+                  <a:txBody>
+                    <a:bodyPr/>
+                    <a:lstStyle/>
+                    <a:p>
+                      <a:pPr lvl="0">
+                        <a:buNone/>
+                      </a:pPr>
+                      <a:r>
+                        <a:rPr lang="en-US" sz="1800" b="0" i="0" u="none" strike="noStrike" noProof="0">
+                          <a:solidFill>
+                            <a:schemeClr val="accent6"/>
+                          </a:solidFill>
+                          <a:latin typeface="Calibri"/>
+                        </a:rPr>
+                        <a:t>✔</a:t>
+                      </a:r>
+                      <a:endParaRPr lang="en-US"/>
+                    </a:p>
+                  </a:txBody>
+                  <a:tcPr/>
+                </a:tc>
+                <a:tc>
+                  <a:txBody>
+                    <a:bodyPr/>
+                    <a:lstStyle/>
+                    <a:p>
+                      <a:pPr lvl="0">
+                        <a:buNone/>
+                      </a:pPr>
+                      <a:r>
+                        <a:rPr lang="fr-FR" sz="1800" b="0" i="0" u="none" strike="noStrike" noProof="0">
+                          <a:solidFill>
+                            <a:schemeClr val="tx1"/>
+                          </a:solidFill>
+                          <a:latin typeface="Arial"/>
+                        </a:rPr>
+                        <a:t>Les professeurs doivent manger entre 13h et 14h</a:t>
+                      </a:r>
+                      <a:endParaRPr lang="en-US">
+                        <a:solidFill>
+                          <a:schemeClr val="tx1"/>
+                        </a:solidFill>
+                        <a:latin typeface="Arial"/>
+                      </a:endParaRPr>
+                    </a:p>
+                  </a:txBody>
+                  <a:tcPr/>
+                </a:tc>
+                <a:extLst>
+                  <a:ext uri="{0D108BD9-81ED-4DB2-BD59-A6C34878D82A}">
+                    <a16:rowId xmlns:a16="http://schemas.microsoft.com/office/drawing/2014/main" val="4279919142"/>
+                  </a:ext>
+                </a:extLst>
+              </a:tr>
+              <a:tr h="370840">
+                <a:tc>
+                  <a:txBody>
+                    <a:bodyPr/>
+                    <a:lstStyle/>
+                    <a:p>
+                      <a:pPr lvl="0">
+                        <a:buNone/>
+                      </a:pPr>
+                      <a:r>
+                        <a:rPr lang="en-US" sz="1800" b="0" i="0" u="none" strike="noStrike" noProof="0">
+                          <a:solidFill>
+                            <a:schemeClr val="accent6"/>
+                          </a:solidFill>
+                          <a:latin typeface="Calibri"/>
+                        </a:rPr>
+                        <a:t>✔</a:t>
+                      </a:r>
+                      <a:endParaRPr lang="en-US"/>
+                    </a:p>
+                  </a:txBody>
+                  <a:tcPr/>
+                </a:tc>
+                <a:tc>
+                  <a:txBody>
+                    <a:bodyPr/>
+                    <a:lstStyle/>
+                    <a:p>
+                      <a:pPr lvl="0">
+                        <a:buNone/>
+                      </a:pPr>
+                      <a:r>
+                        <a:rPr lang="fr-FR" sz="1800" b="0" i="0" u="none" strike="noStrike" noProof="0">
+                          <a:solidFill>
+                            <a:schemeClr val="tx1"/>
+                          </a:solidFill>
+                          <a:latin typeface="Arial"/>
+                        </a:rPr>
+                        <a:t>Après la génération du planning, pouvoir rajouter des créneaux</a:t>
+                      </a:r>
+                      <a:endParaRPr lang="en-US">
+                        <a:solidFill>
+                          <a:schemeClr val="tx1"/>
+                        </a:solidFill>
+                        <a:latin typeface="Arial"/>
+                      </a:endParaRPr>
+                    </a:p>
+                  </a:txBody>
+                  <a:tcPr/>
+                </a:tc>
+                <a:extLst>
+                  <a:ext uri="{0D108BD9-81ED-4DB2-BD59-A6C34878D82A}">
+                    <a16:rowId xmlns:a16="http://schemas.microsoft.com/office/drawing/2014/main" val="4257036857"/>
+                  </a:ext>
+                </a:extLst>
+              </a:tr>
+              <a:tr h="370840">
+                <a:tc>
+                  <a:txBody>
+                    <a:bodyPr/>
+                    <a:lstStyle/>
+                    <a:p>
+                      <a:pPr lvl="0">
+                        <a:buNone/>
+                      </a:pPr>
+                      <a:r>
+                        <a:rPr lang="en-US" sz="1800" b="0" i="0" u="none" strike="noStrike" noProof="0">
+                          <a:solidFill>
+                            <a:schemeClr val="accent6"/>
+                          </a:solidFill>
+                          <a:latin typeface="Calibri"/>
+                        </a:rPr>
+                        <a:t>✔</a:t>
+                      </a:r>
+                      <a:endParaRPr lang="en-US"/>
+                    </a:p>
+                  </a:txBody>
+                  <a:tcPr/>
+                </a:tc>
+                <a:tc>
+                  <a:txBody>
+                    <a:bodyPr/>
+                    <a:lstStyle/>
+                    <a:p>
+                      <a:pPr lvl="0">
+                        <a:buNone/>
+                      </a:pPr>
+                      <a:r>
+                        <a:rPr lang="fr-FR" sz="1800" b="0" i="0" u="none" strike="noStrike" noProof="0">
+                          <a:solidFill>
+                            <a:schemeClr val="tx1"/>
+                          </a:solidFill>
+                          <a:latin typeface="Arial"/>
+                        </a:rPr>
+                        <a:t>Avoir un créneau vide toutes les 2h30 (5 x 30min)</a:t>
+                      </a:r>
+                      <a:endParaRPr lang="en-US">
+                        <a:solidFill>
+                          <a:schemeClr val="tx1"/>
+                        </a:solidFill>
+                        <a:latin typeface="Arial"/>
+                      </a:endParaRPr>
+                    </a:p>
+                  </a:txBody>
+                  <a:tcPr/>
+                </a:tc>
+                <a:extLst>
+                  <a:ext uri="{0D108BD9-81ED-4DB2-BD59-A6C34878D82A}">
+                    <a16:rowId xmlns:a16="http://schemas.microsoft.com/office/drawing/2014/main" val="4093072226"/>
+                  </a:ext>
+                </a:extLst>
+              </a:tr>
+              <a:tr h="370840">
+                <a:tc>
+                  <a:txBody>
+                    <a:bodyPr/>
+                    <a:lstStyle/>
+                    <a:p>
+                      <a:pPr lvl="0">
+                        <a:buNone/>
+                      </a:pPr>
+                      <a:r>
+                        <a:rPr lang="en-US" sz="1800" b="0" i="0" u="none" strike="noStrike" noProof="0">
+                          <a:solidFill>
+                            <a:schemeClr val="accent6"/>
+                          </a:solidFill>
+                          <a:latin typeface="Calibri"/>
+                        </a:rPr>
+                        <a:t>✔</a:t>
+                      </a:r>
+                      <a:endParaRPr lang="en-US"/>
+                    </a:p>
+                  </a:txBody>
+                  <a:tcPr/>
+                </a:tc>
+                <a:tc>
+                  <a:txBody>
+                    <a:bodyPr/>
+                    <a:lstStyle/>
+                    <a:p>
+                      <a:pPr lvl="0">
+                        <a:buNone/>
+                      </a:pPr>
+                      <a:r>
+                        <a:rPr lang="fr-FR" sz="1800" b="0" i="0" u="none" strike="noStrike" noProof="0">
+                          <a:solidFill>
+                            <a:schemeClr val="tx1"/>
+                          </a:solidFill>
+                          <a:latin typeface="Arial"/>
+                        </a:rPr>
+                        <a:t>Les matières 2I2D et SI ont une préparation en loge</a:t>
+                      </a:r>
+                      <a:endParaRPr lang="en-US">
+                        <a:solidFill>
+                          <a:schemeClr val="tx1"/>
+                        </a:solidFill>
+                        <a:latin typeface="Arial"/>
+                      </a:endParaRPr>
+                    </a:p>
+                  </a:txBody>
+                  <a:tcPr/>
+                </a:tc>
+                <a:extLst>
+                  <a:ext uri="{0D108BD9-81ED-4DB2-BD59-A6C34878D82A}">
+                    <a16:rowId xmlns:a16="http://schemas.microsoft.com/office/drawing/2014/main" val="32463339"/>
+                  </a:ext>
+                </a:extLst>
+              </a:tr>
+              <a:tr h="370840">
+                <a:tc>
+                  <a:txBody>
+                    <a:bodyPr/>
+                    <a:lstStyle/>
+                    <a:p>
+                      <a:pPr lvl="0">
+                        <a:buNone/>
+                      </a:pPr>
+                      <a:r>
+                        <a:rPr lang="en-US" sz="1800" b="0" i="0" u="none" strike="noStrike" noProof="0">
+                          <a:solidFill>
+                            <a:schemeClr val="accent6"/>
+                          </a:solidFill>
+                          <a:latin typeface="Calibri"/>
+                        </a:rPr>
+                        <a:t>✔</a:t>
+                      </a:r>
+                      <a:endParaRPr lang="en-US"/>
+                    </a:p>
+                  </a:txBody>
+                  <a:tcPr/>
+                </a:tc>
+                <a:tc>
+                  <a:txBody>
+                    <a:bodyPr/>
+                    <a:lstStyle/>
+                    <a:p>
+                      <a:pPr lvl="0">
+                        <a:buNone/>
+                      </a:pPr>
+                      <a:r>
+                        <a:rPr lang="fr-FR" sz="1800" b="0" i="0" u="none" strike="noStrike" noProof="0">
+                          <a:solidFill>
+                            <a:schemeClr val="tx1"/>
+                          </a:solidFill>
+                          <a:latin typeface="Arial"/>
+                        </a:rPr>
+                        <a:t>Les candidats de la séries STI2D passent en premier</a:t>
+                      </a:r>
+                      <a:endParaRPr lang="en-US">
+                        <a:solidFill>
+                          <a:schemeClr val="tx1"/>
+                        </a:solidFill>
+                        <a:latin typeface="Arial"/>
+                      </a:endParaRPr>
+                    </a:p>
+                  </a:txBody>
+                  <a:tcPr/>
+                </a:tc>
+                <a:extLst>
+                  <a:ext uri="{0D108BD9-81ED-4DB2-BD59-A6C34878D82A}">
+                    <a16:rowId xmlns:a16="http://schemas.microsoft.com/office/drawing/2014/main" val="220663701"/>
+                  </a:ext>
+                </a:extLst>
+              </a:tr>
+              <a:tr h="370840">
+                <a:tc>
+                  <a:txBody>
+                    <a:bodyPr/>
+                    <a:lstStyle/>
+                    <a:p>
+                      <a:pPr lvl="0">
+                        <a:buNone/>
+                      </a:pPr>
+                      <a:r>
+                        <a:rPr lang="en-US" sz="1800" b="0" i="0" u="none" strike="noStrike" noProof="0">
+                          <a:solidFill>
+                            <a:schemeClr val="accent6"/>
+                          </a:solidFill>
+                          <a:latin typeface="Calibri"/>
+                        </a:rPr>
+                        <a:t>✔</a:t>
+                      </a:r>
+                      <a:endParaRPr lang="en-US"/>
+                    </a:p>
+                  </a:txBody>
+                  <a:tcPr/>
+                </a:tc>
+                <a:tc>
+                  <a:txBody>
+                    <a:bodyPr/>
+                    <a:lstStyle/>
+                    <a:p>
+                      <a:pPr lvl="0">
+                        <a:buNone/>
+                      </a:pPr>
+                      <a:r>
+                        <a:rPr lang="fr-FR" sz="1800" b="0" i="0" u="none" strike="noStrike" noProof="0">
+                          <a:solidFill>
+                            <a:schemeClr val="tx1"/>
+                          </a:solidFill>
+                          <a:latin typeface="Arial"/>
+                        </a:rPr>
+                        <a:t>On ne mélanges pas des candidats de série différente</a:t>
+                      </a:r>
+                      <a:endParaRPr lang="en-US">
+                        <a:solidFill>
+                          <a:schemeClr val="tx1"/>
+                        </a:solidFill>
+                        <a:latin typeface="Arial"/>
+                      </a:endParaRPr>
+                    </a:p>
+                  </a:txBody>
+                  <a:tcPr/>
+                </a:tc>
+                <a:extLst>
+                  <a:ext uri="{0D108BD9-81ED-4DB2-BD59-A6C34878D82A}">
+                    <a16:rowId xmlns:a16="http://schemas.microsoft.com/office/drawing/2014/main" val="922188520"/>
+                  </a:ext>
+                </a:extLst>
+              </a:tr>
+              <a:tr h="370840">
+                <a:tc>
+                  <a:txBody>
+                    <a:bodyPr/>
+                    <a:lstStyle/>
+                    <a:p>
+                      <a:pPr lvl="0">
+                        <a:buNone/>
+                      </a:pPr>
+                      <a:r>
+                        <a:rPr lang="en-US" sz="1800" b="0" i="0" u="none" strike="noStrike" noProof="0">
+                          <a:solidFill>
+                            <a:schemeClr val="accent6"/>
+                          </a:solidFill>
+                          <a:latin typeface="Calibri"/>
+                        </a:rPr>
+                        <a:t>✔</a:t>
+                      </a:r>
+                      <a:endParaRPr lang="en-US"/>
+                    </a:p>
+                  </a:txBody>
+                  <a:tcPr/>
+                </a:tc>
+                <a:tc>
+                  <a:txBody>
+                    <a:bodyPr/>
+                    <a:lstStyle/>
+                    <a:p>
+                      <a:pPr marL="0" marR="0" lvl="0" indent="0" algn="l">
+                        <a:lnSpc>
+                          <a:spcPct val="100000"/>
+                        </a:lnSpc>
+                        <a:spcBef>
+                          <a:spcPts val="0"/>
+                        </a:spcBef>
+                        <a:spcAft>
+                          <a:spcPts val="0"/>
+                        </a:spcAft>
+                        <a:buClr>
+                          <a:srgbClr val="000000"/>
+                        </a:buClr>
+                        <a:buNone/>
+                      </a:pPr>
+                      <a:r>
+                        <a:rPr lang="fr-FR" sz="1800" b="0" i="0" u="none" strike="noStrike" noProof="0">
+                          <a:solidFill>
+                            <a:schemeClr val="tx1"/>
+                          </a:solidFill>
+                          <a:latin typeface="Arial"/>
+                        </a:rPr>
+                        <a:t>La matière Math/Physique des STI2D se passe en présence de deux professeurs</a:t>
+                      </a:r>
+                      <a:endParaRPr lang="en-US" sz="1800" b="0" i="0" u="none" strike="noStrike" noProof="0">
+                        <a:solidFill>
+                          <a:schemeClr val="tx1"/>
+                        </a:solidFill>
+                        <a:latin typeface="Arial"/>
+                      </a:endParaRPr>
+                    </a:p>
+                  </a:txBody>
+                  <a:tcPr/>
+                </a:tc>
+                <a:extLst>
+                  <a:ext uri="{0D108BD9-81ED-4DB2-BD59-A6C34878D82A}">
+                    <a16:rowId xmlns:a16="http://schemas.microsoft.com/office/drawing/2014/main" val="2968187026"/>
+                  </a:ext>
+                </a:extLst>
+              </a:tr>
+              <a:tr h="370839">
+                <a:tc>
+                  <a:txBody>
+                    <a:bodyPr/>
+                    <a:lstStyle/>
+                    <a:p>
+                      <a:pPr lvl="0">
+                        <a:buNone/>
+                      </a:pPr>
+                      <a:r>
+                        <a:rPr lang="en-US" sz="1800" b="0" i="0" u="none" strike="noStrike" noProof="0">
+                          <a:solidFill>
+                            <a:schemeClr val="accent6"/>
+                          </a:solidFill>
+                          <a:latin typeface="Calibri"/>
+                        </a:rPr>
+                        <a:t>✔</a:t>
+                      </a:r>
+                      <a:endParaRPr lang="en-US"/>
+                    </a:p>
+                  </a:txBody>
+                  <a:tcPr/>
+                </a:tc>
+                <a:tc>
+                  <a:txBody>
+                    <a:bodyPr/>
+                    <a:lstStyle/>
+                    <a:p>
+                      <a:pPr marL="0" marR="0" lvl="0" indent="0" algn="l">
+                        <a:lnSpc>
+                          <a:spcPct val="100000"/>
+                        </a:lnSpc>
+                        <a:spcBef>
+                          <a:spcPts val="0"/>
+                        </a:spcBef>
+                        <a:spcAft>
+                          <a:spcPts val="0"/>
+                        </a:spcAft>
+                        <a:buClr>
+                          <a:srgbClr val="000000"/>
+                        </a:buClr>
+                        <a:buNone/>
+                      </a:pPr>
+                      <a:r>
+                        <a:rPr lang="fr-FR" sz="1800" b="0" i="0" u="none" strike="noStrike" noProof="0">
+                          <a:solidFill>
+                            <a:schemeClr val="tx1"/>
+                          </a:solidFill>
+                          <a:latin typeface="Arial"/>
+                        </a:rPr>
+                        <a:t>Les élèves n’ont pas accès aux nom de leur professeurs assignés</a:t>
+                      </a:r>
+                      <a:endParaRPr lang="en-US" sz="1800" b="0" i="0" u="none" strike="noStrike" noProof="0">
+                        <a:solidFill>
+                          <a:schemeClr val="tx1"/>
+                        </a:solidFill>
+                        <a:latin typeface="Arial"/>
+                      </a:endParaRPr>
+                    </a:p>
+                  </a:txBody>
+                  <a:tcPr/>
+                </a:tc>
+                <a:extLst>
+                  <a:ext uri="{0D108BD9-81ED-4DB2-BD59-A6C34878D82A}">
+                    <a16:rowId xmlns:a16="http://schemas.microsoft.com/office/drawing/2014/main" val="3507428317"/>
+                  </a:ext>
+                </a:extLst>
+              </a:tr>
+              <a:tr h="370838">
+                <a:tc>
+                  <a:txBody>
+                    <a:bodyPr/>
+                    <a:lstStyle/>
+                    <a:p>
+                      <a:pPr lvl="0">
+                        <a:buNone/>
+                      </a:pPr>
+                      <a:r>
+                        <a:rPr lang="en-US" sz="1800" b="0" i="0" u="none" strike="noStrike" noProof="0">
+                          <a:solidFill>
+                            <a:schemeClr val="accent6"/>
+                          </a:solidFill>
+                          <a:latin typeface="Calibri"/>
+                        </a:rPr>
+                        <a:t>✔</a:t>
+                      </a:r>
+                      <a:endParaRPr lang="en-US"/>
+                    </a:p>
+                  </a:txBody>
+                  <a:tcPr/>
+                </a:tc>
+                <a:tc>
+                  <a:txBody>
+                    <a:bodyPr/>
+                    <a:lstStyle/>
+                    <a:p>
+                      <a:pPr marL="0" marR="0" lvl="0" indent="0" algn="l">
+                        <a:lnSpc>
+                          <a:spcPct val="100000"/>
+                        </a:lnSpc>
+                        <a:spcBef>
+                          <a:spcPts val="0"/>
+                        </a:spcBef>
+                        <a:spcAft>
+                          <a:spcPts val="0"/>
+                        </a:spcAft>
+                        <a:buClr>
+                          <a:srgbClr val="000000"/>
+                        </a:buClr>
+                        <a:buNone/>
+                      </a:pPr>
+                      <a:r>
+                        <a:rPr lang="fr-FR" sz="1800" b="0" i="0" u="none" strike="noStrike" noProof="0">
+                          <a:solidFill>
+                            <a:schemeClr val="tx1"/>
+                          </a:solidFill>
+                          <a:latin typeface="Arial"/>
+                        </a:rPr>
+                        <a:t>Chaque salle dispose d’une feuille d’émargement générée automatiquement</a:t>
+                      </a:r>
+                      <a:endParaRPr lang="en-US" sz="1800" b="0" i="0" u="none" strike="noStrike" noProof="0">
+                        <a:solidFill>
+                          <a:schemeClr val="tx1"/>
+                        </a:solidFill>
+                        <a:latin typeface="Arial"/>
+                      </a:endParaRPr>
+                    </a:p>
+                  </a:txBody>
+                  <a:tcPr/>
+                </a:tc>
+                <a:extLst>
+                  <a:ext uri="{0D108BD9-81ED-4DB2-BD59-A6C34878D82A}">
+                    <a16:rowId xmlns:a16="http://schemas.microsoft.com/office/drawing/2014/main" val="1855614412"/>
+                  </a:ext>
+                </a:extLst>
+              </a:tr>
+              <a:tr h="370838">
+                <a:tc>
+                  <a:txBody>
+                    <a:bodyPr/>
+                    <a:lstStyle/>
+                    <a:p>
+                      <a:pPr lvl="0">
+                        <a:buNone/>
+                      </a:pPr>
+                      <a:r>
+                        <a:rPr lang="en-US" sz="1800" b="0" i="0" u="none" strike="noStrike" noProof="0">
+                          <a:solidFill>
+                            <a:schemeClr val="accent6"/>
+                          </a:solidFill>
+                          <a:latin typeface="Calibri"/>
+                        </a:rPr>
+                        <a:t>✔</a:t>
+                      </a:r>
+                      <a:endParaRPr lang="en-US"/>
+                    </a:p>
+                  </a:txBody>
+                  <a:tcPr/>
+                </a:tc>
+                <a:tc>
+                  <a:txBody>
+                    <a:bodyPr/>
+                    <a:lstStyle/>
+                    <a:p>
+                      <a:pPr marL="0" marR="0" lvl="0" indent="0" algn="l">
+                        <a:lnSpc>
+                          <a:spcPct val="100000"/>
+                        </a:lnSpc>
+                        <a:spcBef>
+                          <a:spcPts val="0"/>
+                        </a:spcBef>
+                        <a:spcAft>
+                          <a:spcPts val="0"/>
+                        </a:spcAft>
+                        <a:buClr>
+                          <a:srgbClr val="000000"/>
+                        </a:buClr>
+                        <a:buNone/>
+                      </a:pPr>
+                      <a:r>
+                        <a:rPr lang="fr-FR" sz="1800" b="0" i="0" u="none" strike="noStrike" noProof="0">
+                          <a:solidFill>
+                            <a:schemeClr val="tx1"/>
+                          </a:solidFill>
+                          <a:latin typeface="Arial"/>
+                        </a:rPr>
+                        <a:t>L’accès au compte administrateur se fait à l’aide d’identifiants sécurisés</a:t>
+                      </a:r>
+                      <a:endParaRPr lang="en-US" sz="1800" b="0" i="0" u="none" strike="noStrike" noProof="0">
+                        <a:solidFill>
+                          <a:schemeClr val="tx1"/>
+                        </a:solidFill>
+                        <a:latin typeface="Arial"/>
+                      </a:endParaRPr>
+                    </a:p>
+                  </a:txBody>
+                  <a:tcPr/>
+                </a:tc>
+                <a:extLst>
+                  <a:ext uri="{0D108BD9-81ED-4DB2-BD59-A6C34878D82A}">
+                    <a16:rowId xmlns:a16="http://schemas.microsoft.com/office/drawing/2014/main" val="1625010738"/>
+                  </a:ext>
+                </a:extLst>
+              </a:tr>
+              <a:tr h="370838">
+                <a:tc>
+                  <a:txBody>
+                    <a:bodyPr/>
+                    <a:lstStyle/>
+                    <a:p>
+                      <a:pPr lvl="0">
+                        <a:buNone/>
+                      </a:pPr>
+                      <a:r>
+                        <a:rPr lang="en-US" sz="1800" b="0" i="0" u="none" strike="noStrike" noProof="0">
+                          <a:solidFill>
+                            <a:schemeClr val="accent6"/>
+                          </a:solidFill>
+                          <a:latin typeface="Calibri"/>
+                        </a:rPr>
+                        <a:t>✔</a:t>
+                      </a:r>
+                      <a:endParaRPr lang="en-US"/>
+                    </a:p>
+                  </a:txBody>
+                  <a:tcPr/>
+                </a:tc>
+                <a:tc>
+                  <a:txBody>
+                    <a:bodyPr/>
+                    <a:lstStyle/>
+                    <a:p>
+                      <a:pPr marL="0" lvl="0" indent="0" algn="l">
+                        <a:lnSpc>
+                          <a:spcPct val="100000"/>
+                        </a:lnSpc>
+                        <a:spcBef>
+                          <a:spcPts val="0"/>
+                        </a:spcBef>
+                        <a:spcAft>
+                          <a:spcPts val="0"/>
+                        </a:spcAft>
+                        <a:buNone/>
+                      </a:pPr>
+                      <a:r>
+                        <a:rPr lang="fr-FR" sz="1800" b="0" i="0" u="none" strike="noStrike" noProof="0">
+                          <a:solidFill>
+                            <a:schemeClr val="tx1"/>
+                          </a:solidFill>
+                          <a:latin typeface="Arial"/>
+                        </a:rPr>
+                        <a:t>Un professeur dispose d’un accès à son emplois du temps</a:t>
+                      </a:r>
+                    </a:p>
+                  </a:txBody>
+                  <a:tcPr/>
+                </a:tc>
+                <a:extLst>
+                  <a:ext uri="{0D108BD9-81ED-4DB2-BD59-A6C34878D82A}">
+                    <a16:rowId xmlns:a16="http://schemas.microsoft.com/office/drawing/2014/main" val="3256662305"/>
+                  </a:ext>
+                </a:extLst>
+              </a:tr>
+              <a:tr h="370838">
+                <a:tc>
+                  <a:txBody>
+                    <a:bodyPr/>
+                    <a:lstStyle/>
+                    <a:p>
+                      <a:pPr lvl="0">
+                        <a:buNone/>
+                      </a:pPr>
+                      <a:r>
+                        <a:rPr lang="en-US" sz="1800" b="0" i="0" u="none" strike="noStrike" noProof="0">
+                          <a:solidFill>
+                            <a:schemeClr val="accent6"/>
+                          </a:solidFill>
+                          <a:latin typeface="Calibri"/>
+                        </a:rPr>
+                        <a:t>✔</a:t>
+                      </a:r>
+                      <a:endParaRPr lang="en-US"/>
+                    </a:p>
+                  </a:txBody>
+                  <a:tcPr/>
+                </a:tc>
+                <a:tc>
+                  <a:txBody>
+                    <a:bodyPr/>
+                    <a:lstStyle/>
+                    <a:p>
+                      <a:pPr marL="0" lvl="0" indent="0" algn="l">
+                        <a:lnSpc>
+                          <a:spcPct val="100000"/>
+                        </a:lnSpc>
+                        <a:spcBef>
+                          <a:spcPts val="0"/>
+                        </a:spcBef>
+                        <a:spcAft>
+                          <a:spcPts val="0"/>
+                        </a:spcAft>
+                        <a:buNone/>
+                      </a:pPr>
+                      <a:r>
+                        <a:rPr lang="fr-FR" sz="1800" b="0" i="0" u="none" strike="noStrike" noProof="0">
+                          <a:solidFill>
+                            <a:schemeClr val="tx1"/>
+                          </a:solidFill>
+                          <a:latin typeface="Arial"/>
+                        </a:rPr>
+                        <a:t>Le calendrier général seras accessible publiquement</a:t>
+                      </a:r>
+                      <a:endParaRPr lang="en-US">
+                        <a:solidFill>
+                          <a:schemeClr val="tx1"/>
+                        </a:solidFill>
+                        <a:latin typeface="Arial"/>
+                      </a:endParaRPr>
+                    </a:p>
+                  </a:txBody>
+                  <a:tcPr/>
+                </a:tc>
+                <a:extLst>
+                  <a:ext uri="{0D108BD9-81ED-4DB2-BD59-A6C34878D82A}">
+                    <a16:rowId xmlns:a16="http://schemas.microsoft.com/office/drawing/2014/main" val="1486000678"/>
+                  </a:ext>
+                </a:extLst>
+              </a:tr>
+              <a:tr h="370838">
+                <a:tc>
+                  <a:txBody>
+                    <a:bodyPr/>
+                    <a:lstStyle/>
+                    <a:p>
+                      <a:pPr lvl="0">
+                        <a:buNone/>
+                      </a:pPr>
+                      <a:r>
+                        <a:rPr lang="en-US" sz="1800" b="0" i="0" u="none" strike="noStrike" noProof="0">
+                          <a:solidFill>
+                            <a:schemeClr val="accent6"/>
+                          </a:solidFill>
+                          <a:latin typeface="Calibri"/>
+                        </a:rPr>
+                        <a:t>✔</a:t>
+                      </a:r>
+                      <a:endParaRPr lang="en-US"/>
+                    </a:p>
+                  </a:txBody>
+                  <a:tcPr/>
+                </a:tc>
+                <a:tc>
+                  <a:txBody>
+                    <a:bodyPr/>
+                    <a:lstStyle/>
+                    <a:p>
+                      <a:pPr marL="0" lvl="0" indent="0" algn="l">
+                        <a:lnSpc>
+                          <a:spcPct val="100000"/>
+                        </a:lnSpc>
+                        <a:spcBef>
+                          <a:spcPts val="0"/>
+                        </a:spcBef>
+                        <a:spcAft>
+                          <a:spcPts val="0"/>
+                        </a:spcAft>
+                        <a:buNone/>
+                      </a:pPr>
+                      <a:r>
+                        <a:rPr lang="fr-FR" sz="1800" b="0" i="0" u="none" strike="noStrike" noProof="0">
+                          <a:solidFill>
+                            <a:schemeClr val="tx1"/>
+                          </a:solidFill>
+                          <a:latin typeface="Arial"/>
+                        </a:rPr>
+                        <a:t>Il faut avoir la possibilité d’obtenir la base de donnée au format Excel</a:t>
+                      </a:r>
+                      <a:endParaRPr lang="en-US">
+                        <a:solidFill>
+                          <a:schemeClr val="tx1"/>
+                        </a:solidFill>
+                        <a:latin typeface="Arial"/>
+                      </a:endParaRPr>
+                    </a:p>
+                  </a:txBody>
+                  <a:tcPr/>
+                </a:tc>
+                <a:extLst>
+                  <a:ext uri="{0D108BD9-81ED-4DB2-BD59-A6C34878D82A}">
+                    <a16:rowId xmlns:a16="http://schemas.microsoft.com/office/drawing/2014/main" val="3679645505"/>
+                  </a:ext>
+                </a:extLst>
+              </a:tr>
+            </a:tbl>
+          </a:graphicData>
+        </a:graphic>
+      </p:graphicFrame>
     </p:spTree>
     <p:extLst>
       <p:ext uri="{BB962C8B-B14F-4D97-AF65-F5344CB8AC3E}">
@@ -4791,7 +6214,7 @@
           <a:lstStyle/>
           <a:p>
             <a:r>
-              <a:rPr lang="fr-FR" sz="2400" b="1" dirty="0">
+              <a:rPr lang="fr-FR" sz="2400" b="1">
                 <a:solidFill>
                   <a:schemeClr val="bg1"/>
                 </a:solidFill>
@@ -4801,7 +6224,7 @@
             </a:r>
           </a:p>
           <a:p>
-            <a:endParaRPr lang="fr-FR" sz="2400" b="1" dirty="0"/>
+            <a:endParaRPr lang="fr-FR" sz="2400" b="1"/>
           </a:p>
         </p:txBody>
       </p:sp>

</xml_diff>

<commit_message>
Fix the bug print loge
</commit_message>
<xml_diff>
--- a/rendu/Réunion2/compte_rendu_presentation.pptx
+++ b/rendu/Réunion2/compte_rendu_presentation.pptx
@@ -120,16 +120,194 @@
 <file path=ppt/revisionInfo.xml><?xml version="1.0" encoding="utf-8"?>
 <p1510:revInfo xmlns:a="http://schemas.openxmlformats.org/drawingml/2006/main" xmlns:r="http://schemas.openxmlformats.org/officeDocument/2006/relationships" xmlns:p1510="http://schemas.microsoft.com/office/powerpoint/2015/10/main">
   <p1510:revLst>
-    <p1510:client id="{47C0E671-DAC3-4384-9B23-DCF598B5F84D}" v="30" dt="2021-11-07T17:56:17.714"/>
-    <p1510:client id="{9FB0D532-23DF-4D18-A03D-CA12A448F23E}" v="25" dt="2021-11-14T13:17:57.516"/>
-    <p1510:client id="{E56EA46B-BE25-4599-968A-C32EF8FFA045}" v="8" dt="2021-11-14T13:15:23.132"/>
-    <p1510:client id="{FA66ABD8-E9D0-4FBA-8621-7425E1B15029}" v="418" dt="2021-11-14T13:31:30.977"/>
+    <p1510:client id="{DB55791E-20B2-4F3D-A601-FBCC60984167}" v="1" dt="2021-11-17T15:52:31.230"/>
   </p1510:revLst>
 </p1510:revInfo>
 </file>
 
 <file path=ppt/changesInfos/changesInfo1.xml><?xml version="1.0" encoding="utf-8"?>
 <pc:chgInfo xmlns:a="http://schemas.openxmlformats.org/drawingml/2006/main" xmlns:r="http://schemas.openxmlformats.org/officeDocument/2006/relationships" xmlns:ac="http://schemas.microsoft.com/office/drawing/2013/main/command" xmlns:pc="http://schemas.microsoft.com/office/powerpoint/2013/main/command">
+  <pc:docChgLst>
+    <pc:chgData name="Maude Hacala" userId="1545789fed03ae4c" providerId="LiveId" clId="{DB55791E-20B2-4F3D-A601-FBCC60984167}"/>
+    <pc:docChg chg="custSel modSld">
+      <pc:chgData name="Maude Hacala" userId="1545789fed03ae4c" providerId="LiveId" clId="{DB55791E-20B2-4F3D-A601-FBCC60984167}" dt="2021-11-17T15:53:02.246" v="6" actId="1076"/>
+      <pc:docMkLst>
+        <pc:docMk/>
+      </pc:docMkLst>
+      <pc:sldChg chg="addSp modSp mod">
+        <pc:chgData name="Maude Hacala" userId="1545789fed03ae4c" providerId="LiveId" clId="{DB55791E-20B2-4F3D-A601-FBCC60984167}" dt="2021-11-17T15:53:02.246" v="6" actId="1076"/>
+        <pc:sldMkLst>
+          <pc:docMk/>
+          <pc:sldMk cId="1533845659" sldId="256"/>
+        </pc:sldMkLst>
+        <pc:picChg chg="add mod">
+          <ac:chgData name="Maude Hacala" userId="1545789fed03ae4c" providerId="LiveId" clId="{DB55791E-20B2-4F3D-A601-FBCC60984167}" dt="2021-11-17T15:53:02.246" v="6" actId="1076"/>
+          <ac:picMkLst>
+            <pc:docMk/>
+            <pc:sldMk cId="1533845659" sldId="256"/>
+            <ac:picMk id="3" creationId="{F8045FE7-51E8-415B-95BA-A68EDE2D310F}"/>
+          </ac:picMkLst>
+        </pc:picChg>
+      </pc:sldChg>
+      <pc:sldChg chg="modSp mod">
+        <pc:chgData name="Maude Hacala" userId="1545789fed03ae4c" providerId="LiveId" clId="{DB55791E-20B2-4F3D-A601-FBCC60984167}" dt="2021-11-17T15:44:14.534" v="2" actId="20577"/>
+        <pc:sldMkLst>
+          <pc:docMk/>
+          <pc:sldMk cId="628255553" sldId="261"/>
+        </pc:sldMkLst>
+        <pc:graphicFrameChg chg="modGraphic">
+          <ac:chgData name="Maude Hacala" userId="1545789fed03ae4c" providerId="LiveId" clId="{DB55791E-20B2-4F3D-A601-FBCC60984167}" dt="2021-11-17T15:44:14.534" v="2" actId="20577"/>
+          <ac:graphicFrameMkLst>
+            <pc:docMk/>
+            <pc:sldMk cId="628255553" sldId="261"/>
+            <ac:graphicFrameMk id="2" creationId="{9F88CBFE-04DC-45AA-8A1F-EA29EBB51707}"/>
+          </ac:graphicFrameMkLst>
+        </pc:graphicFrameChg>
+      </pc:sldChg>
+    </pc:docChg>
+  </pc:docChgLst>
+  <pc:docChgLst>
+    <pc:chgData name="theau santagiuliana" userId="cf6bbce5b70143e9" providerId="Windows Live" clId="Web-{9FB0D532-23DF-4D18-A03D-CA12A448F23E}"/>
+    <pc:docChg chg="modSld">
+      <pc:chgData name="theau santagiuliana" userId="cf6bbce5b70143e9" providerId="Windows Live" clId="Web-{9FB0D532-23DF-4D18-A03D-CA12A448F23E}" dt="2021-11-14T13:17:06.702" v="10" actId="20577"/>
+      <pc:docMkLst>
+        <pc:docMk/>
+      </pc:docMkLst>
+      <pc:sldChg chg="modSp">
+        <pc:chgData name="theau santagiuliana" userId="cf6bbce5b70143e9" providerId="Windows Live" clId="Web-{9FB0D532-23DF-4D18-A03D-CA12A448F23E}" dt="2021-11-14T13:15:26.356" v="3" actId="20577"/>
+        <pc:sldMkLst>
+          <pc:docMk/>
+          <pc:sldMk cId="2222465883" sldId="257"/>
+        </pc:sldMkLst>
+        <pc:spChg chg="mod">
+          <ac:chgData name="theau santagiuliana" userId="cf6bbce5b70143e9" providerId="Windows Live" clId="Web-{9FB0D532-23DF-4D18-A03D-CA12A448F23E}" dt="2021-11-14T13:15:26.356" v="3" actId="20577"/>
+          <ac:spMkLst>
+            <pc:docMk/>
+            <pc:sldMk cId="2222465883" sldId="257"/>
+            <ac:spMk id="2" creationId="{CB0B2AC1-302F-4BE1-9DF4-D761976E34CA}"/>
+          </ac:spMkLst>
+        </pc:spChg>
+      </pc:sldChg>
+      <pc:sldChg chg="modSp">
+        <pc:chgData name="theau santagiuliana" userId="cf6bbce5b70143e9" providerId="Windows Live" clId="Web-{9FB0D532-23DF-4D18-A03D-CA12A448F23E}" dt="2021-11-14T13:17:06.702" v="10" actId="20577"/>
+        <pc:sldMkLst>
+          <pc:docMk/>
+          <pc:sldMk cId="628255553" sldId="261"/>
+        </pc:sldMkLst>
+        <pc:spChg chg="mod">
+          <ac:chgData name="theau santagiuliana" userId="cf6bbce5b70143e9" providerId="Windows Live" clId="Web-{9FB0D532-23DF-4D18-A03D-CA12A448F23E}" dt="2021-11-14T13:17:06.702" v="10" actId="20577"/>
+          <ac:spMkLst>
+            <pc:docMk/>
+            <pc:sldMk cId="628255553" sldId="261"/>
+            <ac:spMk id="3" creationId="{BB5FF614-9F6E-4555-89EE-27824F7F1A15}"/>
+          </ac:spMkLst>
+        </pc:spChg>
+      </pc:sldChg>
+    </pc:docChg>
+  </pc:docChgLst>
+  <pc:docChgLst>
+    <pc:chgData name="Utilisateur invité" providerId="Windows Live" clId="Web-{E56EA46B-BE25-4599-968A-C32EF8FFA045}"/>
+    <pc:docChg chg="modSld">
+      <pc:chgData name="Utilisateur invité" userId="" providerId="Windows Live" clId="Web-{E56EA46B-BE25-4599-968A-C32EF8FFA045}" dt="2021-11-14T13:15:21.617" v="2" actId="20577"/>
+      <pc:docMkLst>
+        <pc:docMk/>
+      </pc:docMkLst>
+      <pc:sldChg chg="modSp">
+        <pc:chgData name="Utilisateur invité" userId="" providerId="Windows Live" clId="Web-{E56EA46B-BE25-4599-968A-C32EF8FFA045}" dt="2021-11-14T13:15:21.617" v="2" actId="20577"/>
+        <pc:sldMkLst>
+          <pc:docMk/>
+          <pc:sldMk cId="2222465883" sldId="257"/>
+        </pc:sldMkLst>
+        <pc:spChg chg="mod">
+          <ac:chgData name="Utilisateur invité" userId="" providerId="Windows Live" clId="Web-{E56EA46B-BE25-4599-968A-C32EF8FFA045}" dt="2021-11-14T13:15:21.617" v="2" actId="20577"/>
+          <ac:spMkLst>
+            <pc:docMk/>
+            <pc:sldMk cId="2222465883" sldId="257"/>
+            <ac:spMk id="2" creationId="{CB0B2AC1-302F-4BE1-9DF4-D761976E34CA}"/>
+          </ac:spMkLst>
+        </pc:spChg>
+      </pc:sldChg>
+    </pc:docChg>
+  </pc:docChgLst>
+  <pc:docChgLst>
+    <pc:chgData name="Max Descroix" userId="f54488145faa58a7" providerId="Windows Live" clId="Web-{FA66ABD8-E9D0-4FBA-8621-7425E1B15029}"/>
+    <pc:docChg chg="modSld">
+      <pc:chgData name="Max Descroix" userId="f54488145faa58a7" providerId="Windows Live" clId="Web-{FA66ABD8-E9D0-4FBA-8621-7425E1B15029}" dt="2021-11-14T13:31:30.977" v="364" actId="1076"/>
+      <pc:docMkLst>
+        <pc:docMk/>
+      </pc:docMkLst>
+      <pc:sldChg chg="addSp delSp modSp">
+        <pc:chgData name="Max Descroix" userId="f54488145faa58a7" providerId="Windows Live" clId="Web-{FA66ABD8-E9D0-4FBA-8621-7425E1B15029}" dt="2021-11-14T13:30:49.961" v="356"/>
+        <pc:sldMkLst>
+          <pc:docMk/>
+          <pc:sldMk cId="4126705910" sldId="260"/>
+        </pc:sldMkLst>
+        <pc:spChg chg="mod">
+          <ac:chgData name="Max Descroix" userId="f54488145faa58a7" providerId="Windows Live" clId="Web-{FA66ABD8-E9D0-4FBA-8621-7425E1B15029}" dt="2021-11-14T13:19:04.539" v="4" actId="1076"/>
+          <ac:spMkLst>
+            <pc:docMk/>
+            <pc:sldMk cId="4126705910" sldId="260"/>
+            <ac:spMk id="2" creationId="{5D2CCA75-874A-4BDF-B88F-CA4C14B87C22}"/>
+          </ac:spMkLst>
+        </pc:spChg>
+        <pc:spChg chg="del mod">
+          <ac:chgData name="Max Descroix" userId="f54488145faa58a7" providerId="Windows Live" clId="Web-{FA66ABD8-E9D0-4FBA-8621-7425E1B15029}" dt="2021-11-14T13:24:17.796" v="255"/>
+          <ac:spMkLst>
+            <pc:docMk/>
+            <pc:sldMk cId="4126705910" sldId="260"/>
+            <ac:spMk id="3" creationId="{FCC3E8AE-BB0E-419D-8C29-7BF50626EEE3}"/>
+          </ac:spMkLst>
+        </pc:spChg>
+        <pc:graphicFrameChg chg="add del mod modGraphic">
+          <ac:chgData name="Max Descroix" userId="f54488145faa58a7" providerId="Windows Live" clId="Web-{FA66ABD8-E9D0-4FBA-8621-7425E1B15029}" dt="2021-11-14T13:28:46.224" v="297"/>
+          <ac:graphicFrameMkLst>
+            <pc:docMk/>
+            <pc:sldMk cId="4126705910" sldId="260"/>
+            <ac:graphicFrameMk id="4" creationId="{08176887-2004-4FA6-AA1D-B6C7AE673369}"/>
+          </ac:graphicFrameMkLst>
+        </pc:graphicFrameChg>
+        <pc:graphicFrameChg chg="add mod modGraphic">
+          <ac:chgData name="Max Descroix" userId="f54488145faa58a7" providerId="Windows Live" clId="Web-{FA66ABD8-E9D0-4FBA-8621-7425E1B15029}" dt="2021-11-14T13:30:49.961" v="356"/>
+          <ac:graphicFrameMkLst>
+            <pc:docMk/>
+            <pc:sldMk cId="4126705910" sldId="260"/>
+            <ac:graphicFrameMk id="6" creationId="{FE59F89A-C57D-4207-87DE-C1AFC9C81146}"/>
+          </ac:graphicFrameMkLst>
+        </pc:graphicFrameChg>
+      </pc:sldChg>
+      <pc:sldChg chg="addSp delSp modSp">
+        <pc:chgData name="Max Descroix" userId="f54488145faa58a7" providerId="Windows Live" clId="Web-{FA66ABD8-E9D0-4FBA-8621-7425E1B15029}" dt="2021-11-14T13:31:30.977" v="364" actId="1076"/>
+        <pc:sldMkLst>
+          <pc:docMk/>
+          <pc:sldMk cId="628255553" sldId="261"/>
+        </pc:sldMkLst>
+        <pc:spChg chg="del mod">
+          <ac:chgData name="Max Descroix" userId="f54488145faa58a7" providerId="Windows Live" clId="Web-{FA66ABD8-E9D0-4FBA-8621-7425E1B15029}" dt="2021-11-14T13:24:21.186" v="256"/>
+          <ac:spMkLst>
+            <pc:docMk/>
+            <pc:sldMk cId="628255553" sldId="261"/>
+            <ac:spMk id="3" creationId="{BB5FF614-9F6E-4555-89EE-27824F7F1A15}"/>
+          </ac:spMkLst>
+        </pc:spChg>
+        <pc:spChg chg="add mod">
+          <ac:chgData name="Max Descroix" userId="f54488145faa58a7" providerId="Windows Live" clId="Web-{FA66ABD8-E9D0-4FBA-8621-7425E1B15029}" dt="2021-11-14T13:31:30.977" v="364" actId="1076"/>
+          <ac:spMkLst>
+            <pc:docMk/>
+            <pc:sldMk cId="628255553" sldId="261"/>
+            <ac:spMk id="5" creationId="{91EDAF69-76AD-4516-8612-382F3AF4AF8D}"/>
+          </ac:spMkLst>
+        </pc:spChg>
+        <pc:graphicFrameChg chg="add mod modGraphic">
+          <ac:chgData name="Max Descroix" userId="f54488145faa58a7" providerId="Windows Live" clId="Web-{FA66ABD8-E9D0-4FBA-8621-7425E1B15029}" dt="2021-11-14T13:30:36.664" v="324"/>
+          <ac:graphicFrameMkLst>
+            <pc:docMk/>
+            <pc:sldMk cId="628255553" sldId="261"/>
+            <ac:graphicFrameMk id="2" creationId="{9F88CBFE-04DC-45AA-8A1F-EA29EBB51707}"/>
+          </ac:graphicFrameMkLst>
+        </pc:graphicFrameChg>
+      </pc:sldChg>
+    </pc:docChg>
+  </pc:docChgLst>
   <pc:docChgLst>
     <pc:chgData name="LOUIS h" userId="3c19b57dbe931898" providerId="LiveId" clId="{47C0E671-DAC3-4384-9B23-DCF598B5F84D}"/>
     <pc:docChg chg="undo custSel addSld modSld modMainMaster">
@@ -420,148 +598,6 @@
       </pc:sldMasterChg>
     </pc:docChg>
   </pc:docChgLst>
-  <pc:docChgLst>
-    <pc:chgData name="Utilisateur invité" providerId="Windows Live" clId="Web-{E56EA46B-BE25-4599-968A-C32EF8FFA045}"/>
-    <pc:docChg chg="modSld">
-      <pc:chgData name="Utilisateur invité" userId="" providerId="Windows Live" clId="Web-{E56EA46B-BE25-4599-968A-C32EF8FFA045}" dt="2021-11-14T13:15:21.617" v="2" actId="20577"/>
-      <pc:docMkLst>
-        <pc:docMk/>
-      </pc:docMkLst>
-      <pc:sldChg chg="modSp">
-        <pc:chgData name="Utilisateur invité" userId="" providerId="Windows Live" clId="Web-{E56EA46B-BE25-4599-968A-C32EF8FFA045}" dt="2021-11-14T13:15:21.617" v="2" actId="20577"/>
-        <pc:sldMkLst>
-          <pc:docMk/>
-          <pc:sldMk cId="2222465883" sldId="257"/>
-        </pc:sldMkLst>
-        <pc:spChg chg="mod">
-          <ac:chgData name="Utilisateur invité" userId="" providerId="Windows Live" clId="Web-{E56EA46B-BE25-4599-968A-C32EF8FFA045}" dt="2021-11-14T13:15:21.617" v="2" actId="20577"/>
-          <ac:spMkLst>
-            <pc:docMk/>
-            <pc:sldMk cId="2222465883" sldId="257"/>
-            <ac:spMk id="2" creationId="{CB0B2AC1-302F-4BE1-9DF4-D761976E34CA}"/>
-          </ac:spMkLst>
-        </pc:spChg>
-      </pc:sldChg>
-    </pc:docChg>
-  </pc:docChgLst>
-  <pc:docChgLst>
-    <pc:chgData name="Max Descroix" userId="f54488145faa58a7" providerId="Windows Live" clId="Web-{FA66ABD8-E9D0-4FBA-8621-7425E1B15029}"/>
-    <pc:docChg chg="modSld">
-      <pc:chgData name="Max Descroix" userId="f54488145faa58a7" providerId="Windows Live" clId="Web-{FA66ABD8-E9D0-4FBA-8621-7425E1B15029}" dt="2021-11-14T13:31:30.977" v="364" actId="1076"/>
-      <pc:docMkLst>
-        <pc:docMk/>
-      </pc:docMkLst>
-      <pc:sldChg chg="addSp delSp modSp">
-        <pc:chgData name="Max Descroix" userId="f54488145faa58a7" providerId="Windows Live" clId="Web-{FA66ABD8-E9D0-4FBA-8621-7425E1B15029}" dt="2021-11-14T13:30:49.961" v="356"/>
-        <pc:sldMkLst>
-          <pc:docMk/>
-          <pc:sldMk cId="4126705910" sldId="260"/>
-        </pc:sldMkLst>
-        <pc:spChg chg="mod">
-          <ac:chgData name="Max Descroix" userId="f54488145faa58a7" providerId="Windows Live" clId="Web-{FA66ABD8-E9D0-4FBA-8621-7425E1B15029}" dt="2021-11-14T13:19:04.539" v="4" actId="1076"/>
-          <ac:spMkLst>
-            <pc:docMk/>
-            <pc:sldMk cId="4126705910" sldId="260"/>
-            <ac:spMk id="2" creationId="{5D2CCA75-874A-4BDF-B88F-CA4C14B87C22}"/>
-          </ac:spMkLst>
-        </pc:spChg>
-        <pc:spChg chg="del mod">
-          <ac:chgData name="Max Descroix" userId="f54488145faa58a7" providerId="Windows Live" clId="Web-{FA66ABD8-E9D0-4FBA-8621-7425E1B15029}" dt="2021-11-14T13:24:17.796" v="255"/>
-          <ac:spMkLst>
-            <pc:docMk/>
-            <pc:sldMk cId="4126705910" sldId="260"/>
-            <ac:spMk id="3" creationId="{FCC3E8AE-BB0E-419D-8C29-7BF50626EEE3}"/>
-          </ac:spMkLst>
-        </pc:spChg>
-        <pc:graphicFrameChg chg="add del mod modGraphic">
-          <ac:chgData name="Max Descroix" userId="f54488145faa58a7" providerId="Windows Live" clId="Web-{FA66ABD8-E9D0-4FBA-8621-7425E1B15029}" dt="2021-11-14T13:28:46.224" v="297"/>
-          <ac:graphicFrameMkLst>
-            <pc:docMk/>
-            <pc:sldMk cId="4126705910" sldId="260"/>
-            <ac:graphicFrameMk id="4" creationId="{08176887-2004-4FA6-AA1D-B6C7AE673369}"/>
-          </ac:graphicFrameMkLst>
-        </pc:graphicFrameChg>
-        <pc:graphicFrameChg chg="add mod modGraphic">
-          <ac:chgData name="Max Descroix" userId="f54488145faa58a7" providerId="Windows Live" clId="Web-{FA66ABD8-E9D0-4FBA-8621-7425E1B15029}" dt="2021-11-14T13:30:49.961" v="356"/>
-          <ac:graphicFrameMkLst>
-            <pc:docMk/>
-            <pc:sldMk cId="4126705910" sldId="260"/>
-            <ac:graphicFrameMk id="6" creationId="{FE59F89A-C57D-4207-87DE-C1AFC9C81146}"/>
-          </ac:graphicFrameMkLst>
-        </pc:graphicFrameChg>
-      </pc:sldChg>
-      <pc:sldChg chg="addSp delSp modSp">
-        <pc:chgData name="Max Descroix" userId="f54488145faa58a7" providerId="Windows Live" clId="Web-{FA66ABD8-E9D0-4FBA-8621-7425E1B15029}" dt="2021-11-14T13:31:30.977" v="364" actId="1076"/>
-        <pc:sldMkLst>
-          <pc:docMk/>
-          <pc:sldMk cId="628255553" sldId="261"/>
-        </pc:sldMkLst>
-        <pc:spChg chg="del mod">
-          <ac:chgData name="Max Descroix" userId="f54488145faa58a7" providerId="Windows Live" clId="Web-{FA66ABD8-E9D0-4FBA-8621-7425E1B15029}" dt="2021-11-14T13:24:21.186" v="256"/>
-          <ac:spMkLst>
-            <pc:docMk/>
-            <pc:sldMk cId="628255553" sldId="261"/>
-            <ac:spMk id="3" creationId="{BB5FF614-9F6E-4555-89EE-27824F7F1A15}"/>
-          </ac:spMkLst>
-        </pc:spChg>
-        <pc:spChg chg="add mod">
-          <ac:chgData name="Max Descroix" userId="f54488145faa58a7" providerId="Windows Live" clId="Web-{FA66ABD8-E9D0-4FBA-8621-7425E1B15029}" dt="2021-11-14T13:31:30.977" v="364" actId="1076"/>
-          <ac:spMkLst>
-            <pc:docMk/>
-            <pc:sldMk cId="628255553" sldId="261"/>
-            <ac:spMk id="5" creationId="{91EDAF69-76AD-4516-8612-382F3AF4AF8D}"/>
-          </ac:spMkLst>
-        </pc:spChg>
-        <pc:graphicFrameChg chg="add mod modGraphic">
-          <ac:chgData name="Max Descroix" userId="f54488145faa58a7" providerId="Windows Live" clId="Web-{FA66ABD8-E9D0-4FBA-8621-7425E1B15029}" dt="2021-11-14T13:30:36.664" v="324"/>
-          <ac:graphicFrameMkLst>
-            <pc:docMk/>
-            <pc:sldMk cId="628255553" sldId="261"/>
-            <ac:graphicFrameMk id="2" creationId="{9F88CBFE-04DC-45AA-8A1F-EA29EBB51707}"/>
-          </ac:graphicFrameMkLst>
-        </pc:graphicFrameChg>
-      </pc:sldChg>
-    </pc:docChg>
-  </pc:docChgLst>
-  <pc:docChgLst>
-    <pc:chgData name="theau santagiuliana" userId="cf6bbce5b70143e9" providerId="Windows Live" clId="Web-{9FB0D532-23DF-4D18-A03D-CA12A448F23E}"/>
-    <pc:docChg chg="modSld">
-      <pc:chgData name="theau santagiuliana" userId="cf6bbce5b70143e9" providerId="Windows Live" clId="Web-{9FB0D532-23DF-4D18-A03D-CA12A448F23E}" dt="2021-11-14T13:17:06.702" v="10" actId="20577"/>
-      <pc:docMkLst>
-        <pc:docMk/>
-      </pc:docMkLst>
-      <pc:sldChg chg="modSp">
-        <pc:chgData name="theau santagiuliana" userId="cf6bbce5b70143e9" providerId="Windows Live" clId="Web-{9FB0D532-23DF-4D18-A03D-CA12A448F23E}" dt="2021-11-14T13:15:26.356" v="3" actId="20577"/>
-        <pc:sldMkLst>
-          <pc:docMk/>
-          <pc:sldMk cId="2222465883" sldId="257"/>
-        </pc:sldMkLst>
-        <pc:spChg chg="mod">
-          <ac:chgData name="theau santagiuliana" userId="cf6bbce5b70143e9" providerId="Windows Live" clId="Web-{9FB0D532-23DF-4D18-A03D-CA12A448F23E}" dt="2021-11-14T13:15:26.356" v="3" actId="20577"/>
-          <ac:spMkLst>
-            <pc:docMk/>
-            <pc:sldMk cId="2222465883" sldId="257"/>
-            <ac:spMk id="2" creationId="{CB0B2AC1-302F-4BE1-9DF4-D761976E34CA}"/>
-          </ac:spMkLst>
-        </pc:spChg>
-      </pc:sldChg>
-      <pc:sldChg chg="modSp">
-        <pc:chgData name="theau santagiuliana" userId="cf6bbce5b70143e9" providerId="Windows Live" clId="Web-{9FB0D532-23DF-4D18-A03D-CA12A448F23E}" dt="2021-11-14T13:17:06.702" v="10" actId="20577"/>
-        <pc:sldMkLst>
-          <pc:docMk/>
-          <pc:sldMk cId="628255553" sldId="261"/>
-        </pc:sldMkLst>
-        <pc:spChg chg="mod">
-          <ac:chgData name="theau santagiuliana" userId="cf6bbce5b70143e9" providerId="Windows Live" clId="Web-{9FB0D532-23DF-4D18-A03D-CA12A448F23E}" dt="2021-11-14T13:17:06.702" v="10" actId="20577"/>
-          <ac:spMkLst>
-            <pc:docMk/>
-            <pc:sldMk cId="628255553" sldId="261"/>
-            <ac:spMk id="3" creationId="{BB5FF614-9F6E-4555-89EE-27824F7F1A15}"/>
-          </ac:spMkLst>
-        </pc:spChg>
-      </pc:sldChg>
-    </pc:docChg>
-  </pc:docChgLst>
 </pc:chgInfo>
 </file>
 
@@ -712,7 +748,7 @@
           <a:p>
             <a:fld id="{7B1B4679-9E8C-4348-B8D3-231D02E9AF43}" type="datetimeFigureOut">
               <a:rPr lang="fr-FR" smtClean="0"/>
-              <a:t>14/11/2021</a:t>
+              <a:t>17/11/2021</a:t>
             </a:fld>
             <a:endParaRPr lang="fr-FR"/>
           </a:p>
@@ -766,7 +802,7 @@
           <a:p>
             <a:fld id="{54DF5B3C-8D38-4D5E-BE25-A2025335896E}" type="slidenum">
               <a:rPr lang="fr-FR" smtClean="0"/>
-              <a:t>‹#›</a:t>
+              <a:t>‹N°›</a:t>
             </a:fld>
             <a:endParaRPr lang="fr-FR"/>
           </a:p>
@@ -910,7 +946,7 @@
           <a:p>
             <a:fld id="{7B1B4679-9E8C-4348-B8D3-231D02E9AF43}" type="datetimeFigureOut">
               <a:rPr lang="fr-FR" smtClean="0"/>
-              <a:t>14/11/2021</a:t>
+              <a:t>17/11/2021</a:t>
             </a:fld>
             <a:endParaRPr lang="fr-FR"/>
           </a:p>
@@ -964,7 +1000,7 @@
           <a:p>
             <a:fld id="{54DF5B3C-8D38-4D5E-BE25-A2025335896E}" type="slidenum">
               <a:rPr lang="fr-FR" smtClean="0"/>
-              <a:t>‹#›</a:t>
+              <a:t>‹N°›</a:t>
             </a:fld>
             <a:endParaRPr lang="fr-FR"/>
           </a:p>
@@ -1118,7 +1154,7 @@
           <a:p>
             <a:fld id="{7B1B4679-9E8C-4348-B8D3-231D02E9AF43}" type="datetimeFigureOut">
               <a:rPr lang="fr-FR" smtClean="0"/>
-              <a:t>14/11/2021</a:t>
+              <a:t>17/11/2021</a:t>
             </a:fld>
             <a:endParaRPr lang="fr-FR"/>
           </a:p>
@@ -1172,7 +1208,7 @@
           <a:p>
             <a:fld id="{54DF5B3C-8D38-4D5E-BE25-A2025335896E}" type="slidenum">
               <a:rPr lang="fr-FR" smtClean="0"/>
-              <a:t>‹#›</a:t>
+              <a:t>‹N°›</a:t>
             </a:fld>
             <a:endParaRPr lang="fr-FR"/>
           </a:p>
@@ -1316,7 +1352,7 @@
           <a:p>
             <a:fld id="{7B1B4679-9E8C-4348-B8D3-231D02E9AF43}" type="datetimeFigureOut">
               <a:rPr lang="fr-FR" smtClean="0"/>
-              <a:t>14/11/2021</a:t>
+              <a:t>17/11/2021</a:t>
             </a:fld>
             <a:endParaRPr lang="fr-FR"/>
           </a:p>
@@ -1370,7 +1406,7 @@
           <a:p>
             <a:fld id="{54DF5B3C-8D38-4D5E-BE25-A2025335896E}" type="slidenum">
               <a:rPr lang="fr-FR" smtClean="0"/>
-              <a:t>‹#›</a:t>
+              <a:t>‹N°›</a:t>
             </a:fld>
             <a:endParaRPr lang="fr-FR"/>
           </a:p>
@@ -1591,7 +1627,7 @@
           <a:p>
             <a:fld id="{7B1B4679-9E8C-4348-B8D3-231D02E9AF43}" type="datetimeFigureOut">
               <a:rPr lang="fr-FR" smtClean="0"/>
-              <a:t>14/11/2021</a:t>
+              <a:t>17/11/2021</a:t>
             </a:fld>
             <a:endParaRPr lang="fr-FR"/>
           </a:p>
@@ -1645,7 +1681,7 @@
           <a:p>
             <a:fld id="{54DF5B3C-8D38-4D5E-BE25-A2025335896E}" type="slidenum">
               <a:rPr lang="fr-FR" smtClean="0"/>
-              <a:t>‹#›</a:t>
+              <a:t>‹N°›</a:t>
             </a:fld>
             <a:endParaRPr lang="fr-FR"/>
           </a:p>
@@ -1856,7 +1892,7 @@
           <a:p>
             <a:fld id="{7B1B4679-9E8C-4348-B8D3-231D02E9AF43}" type="datetimeFigureOut">
               <a:rPr lang="fr-FR" smtClean="0"/>
-              <a:t>14/11/2021</a:t>
+              <a:t>17/11/2021</a:t>
             </a:fld>
             <a:endParaRPr lang="fr-FR"/>
           </a:p>
@@ -1910,7 +1946,7 @@
           <a:p>
             <a:fld id="{54DF5B3C-8D38-4D5E-BE25-A2025335896E}" type="slidenum">
               <a:rPr lang="fr-FR" smtClean="0"/>
-              <a:t>‹#›</a:t>
+              <a:t>‹N°›</a:t>
             </a:fld>
             <a:endParaRPr lang="fr-FR"/>
           </a:p>
@@ -2268,7 +2304,7 @@
           <a:p>
             <a:fld id="{7B1B4679-9E8C-4348-B8D3-231D02E9AF43}" type="datetimeFigureOut">
               <a:rPr lang="fr-FR" smtClean="0"/>
-              <a:t>14/11/2021</a:t>
+              <a:t>17/11/2021</a:t>
             </a:fld>
             <a:endParaRPr lang="fr-FR"/>
           </a:p>
@@ -2322,7 +2358,7 @@
           <a:p>
             <a:fld id="{54DF5B3C-8D38-4D5E-BE25-A2025335896E}" type="slidenum">
               <a:rPr lang="fr-FR" smtClean="0"/>
-              <a:t>‹#›</a:t>
+              <a:t>‹N°›</a:t>
             </a:fld>
             <a:endParaRPr lang="fr-FR"/>
           </a:p>
@@ -2409,7 +2445,7 @@
           <a:p>
             <a:fld id="{7B1B4679-9E8C-4348-B8D3-231D02E9AF43}" type="datetimeFigureOut">
               <a:rPr lang="fr-FR" smtClean="0"/>
-              <a:t>14/11/2021</a:t>
+              <a:t>17/11/2021</a:t>
             </a:fld>
             <a:endParaRPr lang="fr-FR"/>
           </a:p>
@@ -2463,7 +2499,7 @@
           <a:p>
             <a:fld id="{54DF5B3C-8D38-4D5E-BE25-A2025335896E}" type="slidenum">
               <a:rPr lang="fr-FR" smtClean="0"/>
-              <a:t>‹#›</a:t>
+              <a:t>‹N°›</a:t>
             </a:fld>
             <a:endParaRPr lang="fr-FR"/>
           </a:p>
@@ -2522,7 +2558,7 @@
           <a:p>
             <a:fld id="{7B1B4679-9E8C-4348-B8D3-231D02E9AF43}" type="datetimeFigureOut">
               <a:rPr lang="fr-FR" smtClean="0"/>
-              <a:t>14/11/2021</a:t>
+              <a:t>17/11/2021</a:t>
             </a:fld>
             <a:endParaRPr lang="fr-FR"/>
           </a:p>
@@ -2576,7 +2612,7 @@
           <a:p>
             <a:fld id="{54DF5B3C-8D38-4D5E-BE25-A2025335896E}" type="slidenum">
               <a:rPr lang="fr-FR" smtClean="0"/>
-              <a:t>‹#›</a:t>
+              <a:t>‹N°›</a:t>
             </a:fld>
             <a:endParaRPr lang="fr-FR"/>
           </a:p>
@@ -2833,7 +2869,7 @@
           <a:p>
             <a:fld id="{7B1B4679-9E8C-4348-B8D3-231D02E9AF43}" type="datetimeFigureOut">
               <a:rPr lang="fr-FR" smtClean="0"/>
-              <a:t>14/11/2021</a:t>
+              <a:t>17/11/2021</a:t>
             </a:fld>
             <a:endParaRPr lang="fr-FR"/>
           </a:p>
@@ -2887,7 +2923,7 @@
           <a:p>
             <a:fld id="{54DF5B3C-8D38-4D5E-BE25-A2025335896E}" type="slidenum">
               <a:rPr lang="fr-FR" smtClean="0"/>
-              <a:t>‹#›</a:t>
+              <a:t>‹N°›</a:t>
             </a:fld>
             <a:endParaRPr lang="fr-FR"/>
           </a:p>
@@ -3121,7 +3157,7 @@
           <a:p>
             <a:fld id="{7B1B4679-9E8C-4348-B8D3-231D02E9AF43}" type="datetimeFigureOut">
               <a:rPr lang="fr-FR" smtClean="0"/>
-              <a:t>14/11/2021</a:t>
+              <a:t>17/11/2021</a:t>
             </a:fld>
             <a:endParaRPr lang="fr-FR"/>
           </a:p>
@@ -3175,7 +3211,7 @@
           <a:p>
             <a:fld id="{54DF5B3C-8D38-4D5E-BE25-A2025335896E}" type="slidenum">
               <a:rPr lang="fr-FR" smtClean="0"/>
-              <a:t>‹#›</a:t>
+              <a:t>‹N°›</a:t>
             </a:fld>
             <a:endParaRPr lang="fr-FR"/>
           </a:p>
@@ -3365,7 +3401,7 @@
           <a:p>
             <a:fld id="{7B1B4679-9E8C-4348-B8D3-231D02E9AF43}" type="datetimeFigureOut">
               <a:rPr lang="fr-FR" smtClean="0"/>
-              <a:t>14/11/2021</a:t>
+              <a:t>17/11/2021</a:t>
             </a:fld>
             <a:endParaRPr lang="fr-FR"/>
           </a:p>
@@ -3455,7 +3491,7 @@
           <a:p>
             <a:fld id="{54DF5B3C-8D38-4D5E-BE25-A2025335896E}" type="slidenum">
               <a:rPr lang="fr-FR" smtClean="0"/>
-              <a:t>‹#›</a:t>
+              <a:t>‹N°›</a:t>
             </a:fld>
             <a:endParaRPr lang="fr-FR"/>
           </a:p>
@@ -3823,6 +3859,42 @@
           </a:p>
         </p:txBody>
       </p:sp>
+      <p:pic>
+        <p:nvPicPr>
+          <p:cNvPr id="3" name="Image 2">
+            <a:extLst>
+              <a:ext uri="{FF2B5EF4-FFF2-40B4-BE49-F238E27FC236}">
+                <a16:creationId xmlns:a16="http://schemas.microsoft.com/office/drawing/2014/main" id="{F8045FE7-51E8-415B-95BA-A68EDE2D310F}"/>
+              </a:ext>
+            </a:extLst>
+          </p:cNvPr>
+          <p:cNvPicPr>
+            <a:picLocks noChangeAspect="1"/>
+          </p:cNvPicPr>
+          <p:nvPr/>
+        </p:nvPicPr>
+        <p:blipFill>
+          <a:blip r:embed="rId2">
+            <a:extLst>
+              <a:ext uri="{28A0092B-C50C-407E-A947-70E740481C1C}">
+                <a14:useLocalDpi xmlns:a14="http://schemas.microsoft.com/office/drawing/2010/main" val="0"/>
+              </a:ext>
+            </a:extLst>
+          </a:blip>
+          <a:stretch>
+            <a:fillRect/>
+          </a:stretch>
+        </p:blipFill>
+        <p:spPr>
+          <a:xfrm>
+            <a:off x="598861" y="643948"/>
+            <a:ext cx="6229955" cy="3217329"/>
+          </a:xfrm>
+          <a:prstGeom prst="rect">
+            <a:avLst/>
+          </a:prstGeom>
+        </p:spPr>
+      </p:pic>
     </p:spTree>
     <p:extLst>
       <p:ext uri="{BB962C8B-B14F-4D97-AF65-F5344CB8AC3E}">
@@ -4283,7 +4355,7 @@
           <p:nvPr>
             <p:extLst>
               <p:ext uri="{D42A27DB-BD31-4B8C-83A1-F6EECF244321}">
-                <p14:modId xmlns:p14="http://schemas.microsoft.com/office/powerpoint/2010/main" val="2665002759"/>
+                <p14:modId xmlns:p14="http://schemas.microsoft.com/office/powerpoint/2010/main" val="2387080904"/>
               </p:ext>
             </p:extLst>
           </p:nvPr>
@@ -4335,7 +4407,7 @@
                     <a:lstStyle/>
                     <a:p>
                       <a:r>
-                        <a:rPr lang="en-US" err="1">
+                        <a:rPr lang="en-US" dirty="0" err="1">
                           <a:solidFill>
                             <a:schemeClr val="bg1"/>
                           </a:solidFill>
@@ -4343,7 +4415,7 @@
                         <a:t>Tâches</a:t>
                       </a:r>
                       <a:r>
-                        <a:rPr lang="en-US">
+                        <a:rPr lang="en-US" dirty="0">
                           <a:solidFill>
                             <a:schemeClr val="bg1"/>
                           </a:solidFill>
@@ -4351,7 +4423,7 @@
                         <a:t> à  </a:t>
                       </a:r>
                       <a:r>
-                        <a:rPr lang="en-US" err="1">
+                        <a:rPr lang="en-US" dirty="0" err="1">
                           <a:solidFill>
                             <a:schemeClr val="bg1"/>
                           </a:solidFill>
@@ -4359,7 +4431,7 @@
                         <a:t>accomplir</a:t>
                       </a:r>
                       <a:r>
-                        <a:rPr lang="en-US">
+                        <a:rPr lang="en-US" dirty="0">
                           <a:solidFill>
                             <a:schemeClr val="bg1"/>
                           </a:solidFill>
@@ -5097,7 +5169,7 @@
                         <a:buNone/>
                       </a:pPr>
                       <a:r>
-                        <a:rPr lang="fr-FR" sz="1800" b="0" i="0" u="none" strike="noStrike" noProof="0">
+                        <a:rPr lang="fr-FR" sz="1800" b="0" i="0" u="none" strike="noStrike" noProof="0" dirty="0">
                           <a:solidFill>
                             <a:schemeClr val="tx1"/>
                           </a:solidFill>
@@ -5105,7 +5177,7 @@
                         </a:rPr>
                         <a:t>Il faut avoir la possibilité d’obtenir la base de donnée au format Excel</a:t>
                       </a:r>
-                      <a:endParaRPr lang="en-US">
+                      <a:endParaRPr lang="en-US" dirty="0">
                         <a:solidFill>
                           <a:schemeClr val="tx1"/>
                         </a:solidFill>
@@ -5318,7 +5390,7 @@
                         <a:buNone/>
                       </a:pPr>
                       <a:r>
-                        <a:rPr lang="en-US" sz="1800" b="1" i="0" u="none" strike="noStrike" noProof="0" err="1">
+                        <a:rPr lang="en-US" sz="1800" b="1" i="0" u="none" strike="noStrike" noProof="0" dirty="0" err="1">
                           <a:solidFill>
                             <a:schemeClr val="bg1"/>
                           </a:solidFill>
@@ -5327,7 +5399,7 @@
                         <a:t>Tâches</a:t>
                       </a:r>
                       <a:r>
-                        <a:rPr lang="en-US" sz="1800" b="1" i="0" u="none" strike="noStrike" noProof="0">
+                        <a:rPr lang="en-US" sz="1800" b="1" i="0" u="none" strike="noStrike" noProof="0" dirty="0">
                           <a:solidFill>
                             <a:schemeClr val="bg1"/>
                           </a:solidFill>
@@ -5336,7 +5408,7 @@
                         <a:t> </a:t>
                       </a:r>
                       <a:r>
-                        <a:rPr lang="en-US" sz="1800" b="1" i="0" u="none" strike="noStrike" noProof="0" err="1">
+                        <a:rPr lang="en-US" sz="1800" b="1" i="0" u="none" strike="noStrike" noProof="0" dirty="0" err="1">
                           <a:solidFill>
                             <a:schemeClr val="bg1"/>
                           </a:solidFill>
@@ -5344,6 +5416,12 @@
                         </a:rPr>
                         <a:t>accomplies</a:t>
                       </a:r>
+                      <a:endParaRPr lang="en-US" sz="1800" b="1" i="0" u="none" strike="noStrike" noProof="0" dirty="0">
+                        <a:solidFill>
+                          <a:schemeClr val="bg1"/>
+                        </a:solidFill>
+                        <a:latin typeface="Calibri"/>
+                      </a:endParaRPr>
                     </a:p>
                   </a:txBody>
                   <a:tcPr/>
@@ -6127,7 +6205,7 @@
                         <a:buNone/>
                       </a:pPr>
                       <a:r>
-                        <a:rPr lang="fr-FR" sz="1800" b="0" i="0" u="none" strike="noStrike" noProof="0">
+                        <a:rPr lang="fr-FR" sz="1800" b="0" i="0" u="none" strike="noStrike" noProof="0" dirty="0">
                           <a:solidFill>
                             <a:schemeClr val="tx1"/>
                           </a:solidFill>
@@ -6135,7 +6213,7 @@
                         </a:rPr>
                         <a:t>Il faut avoir la possibilité d’obtenir la base de donnée au format Excel</a:t>
                       </a:r>
-                      <a:endParaRPr lang="en-US">
+                      <a:endParaRPr lang="en-US" dirty="0">
                         <a:solidFill>
                           <a:schemeClr val="tx1"/>
                         </a:solidFill>

</xml_diff>